<commit_message>
Emanuel made the presentation prettier
</commit_message>
<xml_diff>
--- a/ArchSW-docs/La4j.pptx
+++ b/ArchSW-docs/La4j.pptx
@@ -1,8 +1,8 @@
 
 <file path=ppt/presentation.xml><?xml version="1.0" encoding="utf-8"?>
-<p:presentation xmlns:a="http://schemas.openxmlformats.org/drawingml/2006/main" xmlns:r="http://schemas.openxmlformats.org/officeDocument/2006/relationships" xmlns:p="http://schemas.openxmlformats.org/presentationml/2006/main" saveSubsetFonts="1">
+<p:presentation xmlns:a="http://schemas.openxmlformats.org/drawingml/2006/main" xmlns:r="http://schemas.openxmlformats.org/officeDocument/2006/relationships" xmlns:p="http://schemas.openxmlformats.org/presentationml/2006/main" embedTrueTypeFonts="1" saveSubsetFonts="1">
   <p:sldMasterIdLst>
-    <p:sldMasterId id="2147483660" r:id="rId1"/>
+    <p:sldMasterId id="2147483672" r:id="rId1"/>
   </p:sldMasterIdLst>
   <p:notesMasterIdLst>
     <p:notesMasterId r:id="rId24"/>
@@ -33,6 +33,37 @@
   </p:sldIdLst>
   <p:sldSz cx="12192000" cy="6858000"/>
   <p:notesSz cx="6858000" cy="9144000"/>
+  <p:embeddedFontLst>
+    <p:embeddedFont>
+      <p:font typeface="Consolas" panose="020B0609020204030204" pitchFamily="49" charset="0"/>
+      <p:regular r:id="rId25"/>
+      <p:bold r:id="rId26"/>
+      <p:italic r:id="rId27"/>
+      <p:boldItalic r:id="rId28"/>
+    </p:embeddedFont>
+    <p:embeddedFont>
+      <p:font typeface="Wingdings 3" panose="05040102010807070707" pitchFamily="18" charset="2"/>
+      <p:regular r:id="rId29"/>
+    </p:embeddedFont>
+    <p:embeddedFont>
+      <p:font typeface="Calibri" panose="020F0502020204030204" pitchFamily="34" charset="0"/>
+      <p:regular r:id="rId30"/>
+      <p:bold r:id="rId31"/>
+      <p:italic r:id="rId32"/>
+      <p:boldItalic r:id="rId33"/>
+    </p:embeddedFont>
+    <p:embeddedFont>
+      <p:font typeface="Corbel" panose="020B0503020204020204" pitchFamily="34" charset="0"/>
+      <p:regular r:id="rId34"/>
+      <p:bold r:id="rId35"/>
+      <p:italic r:id="rId36"/>
+      <p:boldItalic r:id="rId37"/>
+    </p:embeddedFont>
+    <p:embeddedFont>
+      <p:font typeface="Wingdings 2" panose="05020102010507070707" pitchFamily="18" charset="2"/>
+      <p:regular r:id="rId38"/>
+    </p:embeddedFont>
+  </p:embeddedFontLst>
   <p:defaultTextStyle>
     <a:defPPr>
       <a:defRPr lang="en-US"/>
@@ -130,7 +161,18 @@
   </p:defaultTextStyle>
   <p:extLst>
     <p:ext uri="{EFAFB233-063F-42B5-8137-9DF3F51BA10A}">
-      <p15:sldGuideLst xmlns:p15="http://schemas.microsoft.com/office/powerpoint/2012/main"/>
+      <p15:sldGuideLst xmlns:p15="http://schemas.microsoft.com/office/powerpoint/2012/main">
+        <p15:guide id="1" orient="horz" pos="2160">
+          <p15:clr>
+            <a:srgbClr val="A4A3A4"/>
+          </p15:clr>
+        </p15:guide>
+        <p15:guide id="2" pos="3840">
+          <p15:clr>
+            <a:srgbClr val="A4A3A4"/>
+          </p15:clr>
+        </p15:guide>
+      </p15:sldGuideLst>
     </p:ext>
   </p:extLst>
 </p:presentation>
@@ -218,7 +260,7 @@
           <a:p>
             <a:fld id="{C294BD2A-B1EE-4C37-98F3-C10BDA314A1A}" type="datetimeFigureOut">
               <a:rPr lang="pt-PT" smtClean="0"/>
-              <a:t>25/05/2016</a:t>
+              <a:t>29/05/2016</a:t>
             </a:fld>
             <a:endParaRPr lang="pt-PT"/>
           </a:p>
@@ -3142,7 +3184,7 @@
 
 <file path=ppt/slideLayouts/slideLayout1.xml><?xml version="1.0" encoding="utf-8"?>
 <p:sldLayout xmlns:a="http://schemas.openxmlformats.org/drawingml/2006/main" xmlns:r="http://schemas.openxmlformats.org/officeDocument/2006/relationships" xmlns:p="http://schemas.openxmlformats.org/presentationml/2006/main" type="title" preserve="1">
-  <p:cSld name="Diapositivo de Título">
+  <p:cSld name="Title Slide">
     <p:spTree>
       <p:nvGrpSpPr>
         <p:cNvPr id="1" name=""/>
@@ -3159,6 +3201,51 @@
       </p:grpSpPr>
       <p:sp>
         <p:nvSpPr>
+          <p:cNvPr id="9" name="Rectangle 8"/>
+          <p:cNvSpPr/>
+          <p:nvPr/>
+        </p:nvSpPr>
+        <p:spPr bwMode="ltGray">
+          <a:xfrm>
+            <a:off x="1" y="0"/>
+            <a:ext cx="12191999" cy="5135430"/>
+          </a:xfrm>
+          <a:prstGeom prst="rect">
+            <a:avLst/>
+          </a:prstGeom>
+          <a:solidFill>
+            <a:srgbClr val="000000"/>
+          </a:solidFill>
+          <a:ln w="48000" cap="flat" cmpd="thickThin" algn="ctr">
+            <a:noFill/>
+            <a:prstDash val="solid"/>
+          </a:ln>
+        </p:spPr>
+        <p:style>
+          <a:lnRef idx="2">
+            <a:schemeClr val="accent1"/>
+          </a:lnRef>
+          <a:fillRef idx="1">
+            <a:schemeClr val="accent1"/>
+          </a:fillRef>
+          <a:effectRef idx="0">
+            <a:schemeClr val="accent1"/>
+          </a:effectRef>
+          <a:fontRef idx="minor">
+            <a:schemeClr val="lt1"/>
+          </a:fontRef>
+        </p:style>
+        <p:txBody>
+          <a:bodyPr rtlCol="0" anchor="ctr"/>
+          <a:lstStyle/>
+          <a:p>
+            <a:pPr algn="ctr" eaLnBrk="1" latinLnBrk="0" hangingPunct="1"/>
+            <a:endParaRPr kumimoji="0" lang="en-US" dirty="0"/>
+          </a:p>
+        </p:txBody>
+      </p:sp>
+      <p:sp>
+        <p:nvSpPr>
           <p:cNvPr id="2" name="Title 1"/>
           <p:cNvSpPr>
             <a:spLocks noGrp="1"/>
@@ -3169,23 +3256,34 @@
         </p:nvSpPr>
         <p:spPr>
           <a:xfrm>
-            <a:off x="1524000" y="1122363"/>
-            <a:ext cx="9144000" cy="2387600"/>
+            <a:off x="914400" y="3355848"/>
+            <a:ext cx="10769600" cy="1673352"/>
           </a:xfrm>
         </p:spPr>
         <p:txBody>
-          <a:bodyPr anchor="b"/>
+          <a:bodyPr vert="horz" lIns="91440" tIns="0" rIns="45720" bIns="0" rtlCol="0" anchor="t">
+            <a:normAutofit/>
+            <a:scene3d>
+              <a:camera prst="orthographicFront"/>
+              <a:lightRig rig="threePt" dir="t">
+                <a:rot lat="0" lon="0" rev="4800000"/>
+              </a:lightRig>
+            </a:scene3d>
+            <a:sp3d prstMaterial="matte">
+              <a:bevelT w="50800" h="10160"/>
+            </a:sp3d>
+          </a:bodyPr>
           <a:lstStyle>
-            <a:lvl1pPr algn="ctr">
-              <a:defRPr sz="6000"/>
+            <a:lvl1pPr algn="l">
+              <a:defRPr sz="4700" b="1"/>
             </a:lvl1pPr>
+            <a:extLst/>
           </a:lstStyle>
           <a:p>
             <a:r>
-              <a:rPr lang="pt-PT"/>
-              <a:t>Clique para editar o estilo</a:t>
-            </a:r>
-            <a:endParaRPr lang="en-US" dirty="0"/>
+              <a:rPr kumimoji="0" lang="en-US"/>
+              <a:t>Click to edit Master title style</a:t>
+            </a:r>
           </a:p>
         </p:txBody>
       </p:sp>
@@ -3201,56 +3299,108 @@
         </p:nvSpPr>
         <p:spPr>
           <a:xfrm>
-            <a:off x="1524000" y="3602038"/>
-            <a:ext cx="9144000" cy="1655762"/>
+            <a:off x="914400" y="1828800"/>
+            <a:ext cx="10769600" cy="1499616"/>
           </a:xfrm>
         </p:spPr>
         <p:txBody>
-          <a:bodyPr/>
+          <a:bodyPr lIns="118872" tIns="0" rIns="45720" bIns="0" anchor="b"/>
           <a:lstStyle>
-            <a:lvl1pPr marL="0" indent="0" algn="ctr">
+            <a:lvl1pPr marL="0" indent="0" algn="l">
               <a:buNone/>
-              <a:defRPr sz="2400"/>
+              <a:defRPr sz="2000">
+                <a:solidFill>
+                  <a:srgbClr val="FFFFFF"/>
+                </a:solidFill>
+              </a:defRPr>
             </a:lvl1pPr>
             <a:lvl2pPr marL="457200" indent="0" algn="ctr">
               <a:buNone/>
-              <a:defRPr sz="2000"/>
+              <a:defRPr>
+                <a:solidFill>
+                  <a:schemeClr val="tx1">
+                    <a:tint val="75000"/>
+                  </a:schemeClr>
+                </a:solidFill>
+              </a:defRPr>
             </a:lvl2pPr>
             <a:lvl3pPr marL="914400" indent="0" algn="ctr">
               <a:buNone/>
-              <a:defRPr sz="1800"/>
+              <a:defRPr>
+                <a:solidFill>
+                  <a:schemeClr val="tx1">
+                    <a:tint val="75000"/>
+                  </a:schemeClr>
+                </a:solidFill>
+              </a:defRPr>
             </a:lvl3pPr>
             <a:lvl4pPr marL="1371600" indent="0" algn="ctr">
               <a:buNone/>
-              <a:defRPr sz="1600"/>
+              <a:defRPr>
+                <a:solidFill>
+                  <a:schemeClr val="tx1">
+                    <a:tint val="75000"/>
+                  </a:schemeClr>
+                </a:solidFill>
+              </a:defRPr>
             </a:lvl4pPr>
             <a:lvl5pPr marL="1828800" indent="0" algn="ctr">
               <a:buNone/>
-              <a:defRPr sz="1600"/>
+              <a:defRPr>
+                <a:solidFill>
+                  <a:schemeClr val="tx1">
+                    <a:tint val="75000"/>
+                  </a:schemeClr>
+                </a:solidFill>
+              </a:defRPr>
             </a:lvl5pPr>
             <a:lvl6pPr marL="2286000" indent="0" algn="ctr">
               <a:buNone/>
-              <a:defRPr sz="1600"/>
+              <a:defRPr>
+                <a:solidFill>
+                  <a:schemeClr val="tx1">
+                    <a:tint val="75000"/>
+                  </a:schemeClr>
+                </a:solidFill>
+              </a:defRPr>
             </a:lvl6pPr>
             <a:lvl7pPr marL="2743200" indent="0" algn="ctr">
               <a:buNone/>
-              <a:defRPr sz="1600"/>
+              <a:defRPr>
+                <a:solidFill>
+                  <a:schemeClr val="tx1">
+                    <a:tint val="75000"/>
+                  </a:schemeClr>
+                </a:solidFill>
+              </a:defRPr>
             </a:lvl7pPr>
             <a:lvl8pPr marL="3200400" indent="0" algn="ctr">
               <a:buNone/>
-              <a:defRPr sz="1600"/>
+              <a:defRPr>
+                <a:solidFill>
+                  <a:schemeClr val="tx1">
+                    <a:tint val="75000"/>
+                  </a:schemeClr>
+                </a:solidFill>
+              </a:defRPr>
             </a:lvl8pPr>
             <a:lvl9pPr marL="3657600" indent="0" algn="ctr">
               <a:buNone/>
-              <a:defRPr sz="1600"/>
+              <a:defRPr>
+                <a:solidFill>
+                  <a:schemeClr val="tx1">
+                    <a:tint val="75000"/>
+                  </a:schemeClr>
+                </a:solidFill>
+              </a:defRPr>
             </a:lvl9pPr>
+            <a:extLst/>
           </a:lstStyle>
           <a:p>
             <a:r>
-              <a:rPr lang="pt-PT"/>
-              <a:t>Clique para editar o estilo do subtítulo do Modelo Global</a:t>
-            </a:r>
-            <a:endParaRPr lang="en-US" dirty="0"/>
+              <a:rPr kumimoji="0" lang="en-US"/>
+              <a:t>Click to edit Master subtitle style</a:t>
+            </a:r>
           </a:p>
         </p:txBody>
       </p:sp>
@@ -3271,7 +3421,7 @@
           <a:p>
             <a:fld id="{FCC1EC4B-B9B2-4A54-9D21-8609282B1C79}" type="datetimeFigureOut">
               <a:rPr lang="pt-PT" smtClean="0"/>
-              <a:t>25/05/2016</a:t>
+              <a:t>29/05/2016</a:t>
             </a:fld>
             <a:endParaRPr lang="pt-PT"/>
           </a:p>
@@ -3319,22 +3469,69 @@
           </a:p>
         </p:txBody>
       </p:sp>
+      <p:sp>
+        <p:nvSpPr>
+          <p:cNvPr id="10" name="Rectangle 9"/>
+          <p:cNvSpPr/>
+          <p:nvPr/>
+        </p:nvSpPr>
+        <p:spPr bwMode="invGray">
+          <a:xfrm>
+            <a:off x="0" y="5128334"/>
+            <a:ext cx="12192000" cy="45720"/>
+          </a:xfrm>
+          <a:prstGeom prst="rect">
+            <a:avLst/>
+          </a:prstGeom>
+          <a:solidFill>
+            <a:srgbClr val="FFFFFF"/>
+          </a:solidFill>
+          <a:ln w="48000" cap="flat" cmpd="thickThin" algn="ctr">
+            <a:noFill/>
+            <a:prstDash val="solid"/>
+          </a:ln>
+          <a:effectLst>
+            <a:outerShdw blurRad="31750" dist="10160" dir="5400000" algn="tl" rotWithShape="0">
+              <a:srgbClr val="000000">
+                <a:alpha val="60000"/>
+              </a:srgbClr>
+            </a:outerShdw>
+          </a:effectLst>
+        </p:spPr>
+        <p:style>
+          <a:lnRef idx="2">
+            <a:schemeClr val="accent1"/>
+          </a:lnRef>
+          <a:fillRef idx="1">
+            <a:schemeClr val="accent1"/>
+          </a:fillRef>
+          <a:effectRef idx="0">
+            <a:schemeClr val="accent1"/>
+          </a:effectRef>
+          <a:fontRef idx="minor">
+            <a:schemeClr val="lt1"/>
+          </a:fontRef>
+        </p:style>
+        <p:txBody>
+          <a:bodyPr rtlCol="0" anchor="ctr"/>
+          <a:lstStyle/>
+          <a:p>
+            <a:pPr algn="ctr" eaLnBrk="1" latinLnBrk="0" hangingPunct="1"/>
+            <a:endParaRPr kumimoji="0" lang="en-US" dirty="0"/>
+          </a:p>
+        </p:txBody>
+      </p:sp>
     </p:spTree>
-    <p:extLst>
-      <p:ext uri="{BB962C8B-B14F-4D97-AF65-F5344CB8AC3E}">
-        <p14:creationId xmlns:p14="http://schemas.microsoft.com/office/powerpoint/2010/main" val="4128251159"/>
-      </p:ext>
-    </p:extLst>
   </p:cSld>
   <p:clrMapOvr>
-    <a:masterClrMapping/>
+    <a:overrideClrMapping bg1="dk1" tx1="lt1" bg2="dk2" tx2="lt2" accent1="accent1" accent2="accent2" accent3="accent3" accent4="accent4" accent5="accent5" accent6="accent6" hlink="hlink" folHlink="folHlink"/>
   </p:clrMapOvr>
 </p:sldLayout>
 </file>
 
 <file path=ppt/slideLayouts/slideLayout10.xml><?xml version="1.0" encoding="utf-8"?>
 <p:sldLayout xmlns:a="http://schemas.openxmlformats.org/drawingml/2006/main" xmlns:r="http://schemas.openxmlformats.org/officeDocument/2006/relationships" xmlns:p="http://schemas.openxmlformats.org/presentationml/2006/main" type="vertTx" preserve="1">
-  <p:cSld name="Título e Texto Vertical">
+  <p:cSld name="Title and Vertical Text">
     <p:spTree>
       <p:nvGrpSpPr>
         <p:cNvPr id="1" name=""/>
@@ -3365,10 +3562,9 @@
           <a:lstStyle/>
           <a:p>
             <a:r>
-              <a:rPr lang="pt-PT"/>
-              <a:t>Clique para editar o estilo</a:t>
-            </a:r>
-            <a:endParaRPr lang="en-US" dirty="0"/>
+              <a:rPr kumimoji="0" lang="en-US"/>
+              <a:t>Click to edit Master title style</a:t>
+            </a:r>
           </a:p>
         </p:txBody>
       </p:sp>
@@ -3387,40 +3583,40 @@
           <a:bodyPr vert="eaVert"/>
           <a:lstStyle/>
           <a:p>
-            <a:pPr lvl="0"/>
-            <a:r>
-              <a:rPr lang="pt-PT"/>
-              <a:t>Editar os estilos de texto do Modelo Global</a:t>
-            </a:r>
-          </a:p>
-          <a:p>
-            <a:pPr lvl="1"/>
-            <a:r>
-              <a:rPr lang="pt-PT"/>
-              <a:t>Segundo nível</a:t>
-            </a:r>
-          </a:p>
-          <a:p>
-            <a:pPr lvl="2"/>
-            <a:r>
-              <a:rPr lang="pt-PT"/>
-              <a:t>Terceiro nível</a:t>
-            </a:r>
-          </a:p>
-          <a:p>
-            <a:pPr lvl="3"/>
-            <a:r>
-              <a:rPr lang="pt-PT"/>
-              <a:t>Quarto nível</a:t>
-            </a:r>
-          </a:p>
-          <a:p>
-            <a:pPr lvl="4"/>
-            <a:r>
-              <a:rPr lang="pt-PT"/>
-              <a:t>Quinto nível</a:t>
-            </a:r>
-            <a:endParaRPr lang="en-US" dirty="0"/>
+            <a:pPr lvl="0" eaLnBrk="1" latinLnBrk="0" hangingPunct="1"/>
+            <a:r>
+              <a:rPr lang="en-US"/>
+              <a:t>Click to edit Master text styles</a:t>
+            </a:r>
+          </a:p>
+          <a:p>
+            <a:pPr lvl="1" eaLnBrk="1" latinLnBrk="0" hangingPunct="1"/>
+            <a:r>
+              <a:rPr lang="en-US"/>
+              <a:t>Second level</a:t>
+            </a:r>
+          </a:p>
+          <a:p>
+            <a:pPr lvl="2" eaLnBrk="1" latinLnBrk="0" hangingPunct="1"/>
+            <a:r>
+              <a:rPr lang="en-US"/>
+              <a:t>Third level</a:t>
+            </a:r>
+          </a:p>
+          <a:p>
+            <a:pPr lvl="3" eaLnBrk="1" latinLnBrk="0" hangingPunct="1"/>
+            <a:r>
+              <a:rPr lang="en-US"/>
+              <a:t>Fourth level</a:t>
+            </a:r>
+          </a:p>
+          <a:p>
+            <a:pPr lvl="4" eaLnBrk="1" latinLnBrk="0" hangingPunct="1"/>
+            <a:r>
+              <a:rPr lang="en-US"/>
+              <a:t>Fifth level</a:t>
+            </a:r>
+            <a:endParaRPr kumimoji="0" lang="en-US"/>
           </a:p>
         </p:txBody>
       </p:sp>
@@ -3441,7 +3637,7 @@
           <a:p>
             <a:fld id="{FCC1EC4B-B9B2-4A54-9D21-8609282B1C79}" type="datetimeFigureOut">
               <a:rPr lang="pt-PT" smtClean="0"/>
-              <a:t>25/05/2016</a:t>
+              <a:t>29/05/2016</a:t>
             </a:fld>
             <a:endParaRPr lang="pt-PT"/>
           </a:p>
@@ -3490,11 +3686,6 @@
         </p:txBody>
       </p:sp>
     </p:spTree>
-    <p:extLst>
-      <p:ext uri="{BB962C8B-B14F-4D97-AF65-F5344CB8AC3E}">
-        <p14:creationId xmlns:p14="http://schemas.microsoft.com/office/powerpoint/2010/main" val="2350416779"/>
-      </p:ext>
-    </p:extLst>
   </p:cSld>
   <p:clrMapOvr>
     <a:masterClrMapping/>
@@ -3504,7 +3695,7 @@
 
 <file path=ppt/slideLayouts/slideLayout11.xml><?xml version="1.0" encoding="utf-8"?>
 <p:sldLayout xmlns:a="http://schemas.openxmlformats.org/drawingml/2006/main" xmlns:r="http://schemas.openxmlformats.org/officeDocument/2006/relationships" xmlns:p="http://schemas.openxmlformats.org/presentationml/2006/main" type="vertTitleAndTx" preserve="1">
-  <p:cSld name="Título Vertical e Texto">
+  <p:cSld name="Vertical Title and Text">
     <p:spTree>
       <p:nvGrpSpPr>
         <p:cNvPr id="1" name=""/>
@@ -3521,6 +3712,103 @@
       </p:grpSpPr>
       <p:sp>
         <p:nvSpPr>
+          <p:cNvPr id="9" name="Rectangle 8"/>
+          <p:cNvSpPr/>
+          <p:nvPr/>
+        </p:nvSpPr>
+        <p:spPr bwMode="invGray">
+          <a:xfrm>
+            <a:off x="8798560" y="0"/>
+            <a:ext cx="60960" cy="6858000"/>
+          </a:xfrm>
+          <a:prstGeom prst="rect">
+            <a:avLst/>
+          </a:prstGeom>
+          <a:solidFill>
+            <a:srgbClr val="FFFFFF"/>
+          </a:solidFill>
+          <a:ln w="48000" cap="flat" cmpd="thickThin" algn="ctr">
+            <a:noFill/>
+            <a:prstDash val="solid"/>
+          </a:ln>
+          <a:effectLst>
+            <a:outerShdw blurRad="31750" dist="10160" dir="10800000" algn="tl" rotWithShape="0">
+              <a:srgbClr val="000000">
+                <a:alpha val="60000"/>
+              </a:srgbClr>
+            </a:outerShdw>
+          </a:effectLst>
+        </p:spPr>
+        <p:style>
+          <a:lnRef idx="2">
+            <a:schemeClr val="accent1"/>
+          </a:lnRef>
+          <a:fillRef idx="1">
+            <a:schemeClr val="accent1"/>
+          </a:fillRef>
+          <a:effectRef idx="0">
+            <a:schemeClr val="accent1"/>
+          </a:effectRef>
+          <a:fontRef idx="minor">
+            <a:schemeClr val="lt1"/>
+          </a:fontRef>
+        </p:style>
+        <p:txBody>
+          <a:bodyPr rtlCol="0" anchor="ctr"/>
+          <a:lstStyle/>
+          <a:p>
+            <a:pPr algn="ctr" eaLnBrk="1" latinLnBrk="0" hangingPunct="1"/>
+            <a:endParaRPr kumimoji="0" lang="en-US" dirty="0"/>
+          </a:p>
+        </p:txBody>
+      </p:sp>
+      <p:sp>
+        <p:nvSpPr>
+          <p:cNvPr id="8" name="Rectangle 7"/>
+          <p:cNvSpPr/>
+          <p:nvPr/>
+        </p:nvSpPr>
+        <p:spPr bwMode="ltGray">
+          <a:xfrm>
+            <a:off x="8863584" y="0"/>
+            <a:ext cx="3352801" cy="6858000"/>
+          </a:xfrm>
+          <a:prstGeom prst="rect">
+            <a:avLst/>
+          </a:prstGeom>
+          <a:solidFill>
+            <a:srgbClr val="000000"/>
+          </a:solidFill>
+          <a:ln w="48000" cap="flat" cmpd="thickThin" algn="ctr">
+            <a:noFill/>
+            <a:prstDash val="solid"/>
+          </a:ln>
+        </p:spPr>
+        <p:style>
+          <a:lnRef idx="2">
+            <a:schemeClr val="accent1"/>
+          </a:lnRef>
+          <a:fillRef idx="1">
+            <a:schemeClr val="accent1"/>
+          </a:fillRef>
+          <a:effectRef idx="0">
+            <a:schemeClr val="accent1"/>
+          </a:effectRef>
+          <a:fontRef idx="minor">
+            <a:schemeClr val="lt1"/>
+          </a:fontRef>
+        </p:style>
+        <p:txBody>
+          <a:bodyPr rtlCol="0" anchor="ctr"/>
+          <a:lstStyle/>
+          <a:p>
+            <a:pPr algn="ctr" eaLnBrk="1" latinLnBrk="0" hangingPunct="1"/>
+            <a:endParaRPr kumimoji="0" lang="en-US" dirty="0"/>
+          </a:p>
+        </p:txBody>
+      </p:sp>
+      <p:sp>
+        <p:nvSpPr>
           <p:cNvPr id="2" name="Vertical Title 1"/>
           <p:cNvSpPr>
             <a:spLocks noGrp="1"/>
@@ -3531,8 +3819,8 @@
         </p:nvSpPr>
         <p:spPr>
           <a:xfrm>
-            <a:off x="8724900" y="365125"/>
-            <a:ext cx="2628900" cy="5811838"/>
+            <a:off x="9042400" y="274641"/>
+            <a:ext cx="2540000" cy="5851525"/>
           </a:xfrm>
         </p:spPr>
         <p:txBody>
@@ -3540,10 +3828,9 @@
           <a:lstStyle/>
           <a:p>
             <a:r>
-              <a:rPr lang="pt-PT"/>
-              <a:t>Clique para editar o estilo</a:t>
-            </a:r>
-            <a:endParaRPr lang="en-US" dirty="0"/>
+              <a:rPr kumimoji="0" lang="en-US"/>
+              <a:t>Click to edit Master title style</a:t>
+            </a:r>
           </a:p>
         </p:txBody>
       </p:sp>
@@ -3559,48 +3846,48 @@
         </p:nvSpPr>
         <p:spPr>
           <a:xfrm>
-            <a:off x="838200" y="365125"/>
-            <a:ext cx="7734300" cy="5811838"/>
+            <a:off x="609600" y="304801"/>
+            <a:ext cx="8026400" cy="5851525"/>
           </a:xfrm>
         </p:spPr>
         <p:txBody>
           <a:bodyPr vert="eaVert"/>
           <a:lstStyle/>
           <a:p>
-            <a:pPr lvl="0"/>
-            <a:r>
-              <a:rPr lang="pt-PT"/>
-              <a:t>Editar os estilos de texto do Modelo Global</a:t>
-            </a:r>
-          </a:p>
-          <a:p>
-            <a:pPr lvl="1"/>
-            <a:r>
-              <a:rPr lang="pt-PT"/>
-              <a:t>Segundo nível</a:t>
-            </a:r>
-          </a:p>
-          <a:p>
-            <a:pPr lvl="2"/>
-            <a:r>
-              <a:rPr lang="pt-PT"/>
-              <a:t>Terceiro nível</a:t>
-            </a:r>
-          </a:p>
-          <a:p>
-            <a:pPr lvl="3"/>
-            <a:r>
-              <a:rPr lang="pt-PT"/>
-              <a:t>Quarto nível</a:t>
-            </a:r>
-          </a:p>
-          <a:p>
-            <a:pPr lvl="4"/>
-            <a:r>
-              <a:rPr lang="pt-PT"/>
-              <a:t>Quinto nível</a:t>
-            </a:r>
-            <a:endParaRPr lang="en-US" dirty="0"/>
+            <a:pPr lvl="0" eaLnBrk="1" latinLnBrk="0" hangingPunct="1"/>
+            <a:r>
+              <a:rPr lang="en-US"/>
+              <a:t>Click to edit Master text styles</a:t>
+            </a:r>
+          </a:p>
+          <a:p>
+            <a:pPr lvl="1" eaLnBrk="1" latinLnBrk="0" hangingPunct="1"/>
+            <a:r>
+              <a:rPr lang="en-US"/>
+              <a:t>Second level</a:t>
+            </a:r>
+          </a:p>
+          <a:p>
+            <a:pPr lvl="2" eaLnBrk="1" latinLnBrk="0" hangingPunct="1"/>
+            <a:r>
+              <a:rPr lang="en-US"/>
+              <a:t>Third level</a:t>
+            </a:r>
+          </a:p>
+          <a:p>
+            <a:pPr lvl="3" eaLnBrk="1" latinLnBrk="0" hangingPunct="1"/>
+            <a:r>
+              <a:rPr lang="en-US"/>
+              <a:t>Fourth level</a:t>
+            </a:r>
+          </a:p>
+          <a:p>
+            <a:pPr lvl="4" eaLnBrk="1" latinLnBrk="0" hangingPunct="1"/>
+            <a:r>
+              <a:rPr lang="en-US"/>
+              <a:t>Fifth level</a:t>
+            </a:r>
+            <a:endParaRPr kumimoji="0" lang="en-US"/>
           </a:p>
         </p:txBody>
       </p:sp>
@@ -3621,7 +3908,7 @@
           <a:p>
             <a:fld id="{FCC1EC4B-B9B2-4A54-9D21-8609282B1C79}" type="datetimeFigureOut">
               <a:rPr lang="pt-PT" smtClean="0"/>
-              <a:t>25/05/2016</a:t>
+              <a:t>29/05/2016</a:t>
             </a:fld>
             <a:endParaRPr lang="pt-PT"/>
           </a:p>
@@ -3637,7 +3924,12 @@
             <p:ph type="ftr" sz="quarter" idx="11"/>
           </p:nvPr>
         </p:nvSpPr>
-        <p:spPr/>
+        <p:spPr>
+          <a:xfrm>
+            <a:off x="3520796" y="6377460"/>
+            <a:ext cx="5115205" cy="365125"/>
+          </a:xfrm>
+        </p:spPr>
         <p:txBody>
           <a:bodyPr/>
           <a:lstStyle/>
@@ -3670,11 +3962,6 @@
         </p:txBody>
       </p:sp>
     </p:spTree>
-    <p:extLst>
-      <p:ext uri="{BB962C8B-B14F-4D97-AF65-F5344CB8AC3E}">
-        <p14:creationId xmlns:p14="http://schemas.microsoft.com/office/powerpoint/2010/main" val="1482575220"/>
-      </p:ext>
-    </p:extLst>
   </p:cSld>
   <p:clrMapOvr>
     <a:masterClrMapping/>
@@ -3684,7 +3971,7 @@
 
 <file path=ppt/slideLayouts/slideLayout2.xml><?xml version="1.0" encoding="utf-8"?>
 <p:sldLayout xmlns:a="http://schemas.openxmlformats.org/drawingml/2006/main" xmlns:r="http://schemas.openxmlformats.org/officeDocument/2006/relationships" xmlns:p="http://schemas.openxmlformats.org/presentationml/2006/main" type="obj" preserve="1">
-  <p:cSld name="Título e Objeto">
+  <p:cSld name="Title and Content">
     <p:spTree>
       <p:nvGrpSpPr>
         <p:cNvPr id="1" name=""/>
@@ -3709,68 +3996,72 @@
             <p:ph type="title"/>
           </p:nvPr>
         </p:nvSpPr>
+        <p:spPr>
+          <a:xfrm>
+            <a:off x="609600" y="155448"/>
+            <a:ext cx="10972800" cy="1252728"/>
+          </a:xfrm>
+        </p:spPr>
+        <p:txBody>
+          <a:bodyPr/>
+          <a:lstStyle/>
+          <a:p>
+            <a:r>
+              <a:rPr kumimoji="0" lang="en-US"/>
+              <a:t>Click to edit Master title style</a:t>
+            </a:r>
+          </a:p>
+        </p:txBody>
+      </p:sp>
+      <p:sp>
+        <p:nvSpPr>
+          <p:cNvPr id="3" name="Content Placeholder 2"/>
+          <p:cNvSpPr>
+            <a:spLocks noGrp="1"/>
+          </p:cNvSpPr>
+          <p:nvPr>
+            <p:ph idx="1"/>
+          </p:nvPr>
+        </p:nvSpPr>
         <p:spPr/>
         <p:txBody>
           <a:bodyPr/>
           <a:lstStyle/>
           <a:p>
-            <a:r>
-              <a:rPr lang="pt-PT"/>
-              <a:t>Clique para editar o estilo</a:t>
-            </a:r>
-            <a:endParaRPr lang="en-US" dirty="0"/>
-          </a:p>
-        </p:txBody>
-      </p:sp>
-      <p:sp>
-        <p:nvSpPr>
-          <p:cNvPr id="3" name="Content Placeholder 2"/>
-          <p:cNvSpPr>
-            <a:spLocks noGrp="1"/>
-          </p:cNvSpPr>
-          <p:nvPr>
-            <p:ph idx="1"/>
-          </p:nvPr>
-        </p:nvSpPr>
-        <p:spPr/>
-        <p:txBody>
-          <a:bodyPr/>
-          <a:lstStyle/>
-          <a:p>
-            <a:pPr lvl="0"/>
-            <a:r>
-              <a:rPr lang="pt-PT"/>
-              <a:t>Editar os estilos de texto do Modelo Global</a:t>
-            </a:r>
-          </a:p>
-          <a:p>
-            <a:pPr lvl="1"/>
-            <a:r>
-              <a:rPr lang="pt-PT"/>
-              <a:t>Segundo nível</a:t>
-            </a:r>
-          </a:p>
-          <a:p>
-            <a:pPr lvl="2"/>
-            <a:r>
-              <a:rPr lang="pt-PT"/>
-              <a:t>Terceiro nível</a:t>
-            </a:r>
-          </a:p>
-          <a:p>
-            <a:pPr lvl="3"/>
-            <a:r>
-              <a:rPr lang="pt-PT"/>
-              <a:t>Quarto nível</a:t>
-            </a:r>
-          </a:p>
-          <a:p>
-            <a:pPr lvl="4"/>
-            <a:r>
-              <a:rPr lang="pt-PT"/>
-              <a:t>Quinto nível</a:t>
-            </a:r>
-            <a:endParaRPr lang="en-US" dirty="0"/>
+            <a:pPr lvl="0" eaLnBrk="1" latinLnBrk="0" hangingPunct="1"/>
+            <a:r>
+              <a:rPr lang="en-US"/>
+              <a:t>Click to edit Master text styles</a:t>
+            </a:r>
+          </a:p>
+          <a:p>
+            <a:pPr lvl="1" eaLnBrk="1" latinLnBrk="0" hangingPunct="1"/>
+            <a:r>
+              <a:rPr lang="en-US"/>
+              <a:t>Second level</a:t>
+            </a:r>
+          </a:p>
+          <a:p>
+            <a:pPr lvl="2" eaLnBrk="1" latinLnBrk="0" hangingPunct="1"/>
+            <a:r>
+              <a:rPr lang="en-US"/>
+              <a:t>Third level</a:t>
+            </a:r>
+          </a:p>
+          <a:p>
+            <a:pPr lvl="3" eaLnBrk="1" latinLnBrk="0" hangingPunct="1"/>
+            <a:r>
+              <a:rPr lang="en-US"/>
+              <a:t>Fourth level</a:t>
+            </a:r>
+          </a:p>
+          <a:p>
+            <a:pPr lvl="4" eaLnBrk="1" latinLnBrk="0" hangingPunct="1"/>
+            <a:r>
+              <a:rPr lang="en-US"/>
+              <a:t>Fifth level</a:t>
+            </a:r>
+            <a:endParaRPr kumimoji="0" lang="en-US"/>
           </a:p>
         </p:txBody>
       </p:sp>
@@ -3791,7 +4082,7 @@
           <a:p>
             <a:fld id="{FCC1EC4B-B9B2-4A54-9D21-8609282B1C79}" type="datetimeFigureOut">
               <a:rPr lang="pt-PT" smtClean="0"/>
-              <a:t>25/05/2016</a:t>
+              <a:t>29/05/2016</a:t>
             </a:fld>
             <a:endParaRPr lang="pt-PT"/>
           </a:p>
@@ -3840,11 +4131,6 @@
         </p:txBody>
       </p:sp>
     </p:spTree>
-    <p:extLst>
-      <p:ext uri="{BB962C8B-B14F-4D97-AF65-F5344CB8AC3E}">
-        <p14:creationId xmlns:p14="http://schemas.microsoft.com/office/powerpoint/2010/main" val="3086633068"/>
-      </p:ext>
-    </p:extLst>
   </p:cSld>
   <p:clrMapOvr>
     <a:masterClrMapping/>
@@ -3854,7 +4140,7 @@
 
 <file path=ppt/slideLayouts/slideLayout3.xml><?xml version="1.0" encoding="utf-8"?>
 <p:sldLayout xmlns:a="http://schemas.openxmlformats.org/drawingml/2006/main" xmlns:r="http://schemas.openxmlformats.org/officeDocument/2006/relationships" xmlns:p="http://schemas.openxmlformats.org/presentationml/2006/main" type="secHead" preserve="1">
-  <p:cSld name="Cabeçalho da Secção">
+  <p:cSld name="Section Header">
     <p:spTree>
       <p:nvGrpSpPr>
         <p:cNvPr id="1" name=""/>
@@ -3871,6 +4157,103 @@
       </p:grpSpPr>
       <p:sp>
         <p:nvSpPr>
+          <p:cNvPr id="9" name="Rectangle 8"/>
+          <p:cNvSpPr/>
+          <p:nvPr/>
+        </p:nvSpPr>
+        <p:spPr bwMode="ltGray">
+          <a:xfrm>
+            <a:off x="0" y="1"/>
+            <a:ext cx="12192000" cy="2602520"/>
+          </a:xfrm>
+          <a:prstGeom prst="rect">
+            <a:avLst/>
+          </a:prstGeom>
+          <a:solidFill>
+            <a:srgbClr val="000000"/>
+          </a:solidFill>
+          <a:ln w="48000" cap="flat" cmpd="thickThin" algn="ctr">
+            <a:noFill/>
+            <a:prstDash val="solid"/>
+          </a:ln>
+        </p:spPr>
+        <p:style>
+          <a:lnRef idx="2">
+            <a:schemeClr val="accent1"/>
+          </a:lnRef>
+          <a:fillRef idx="1">
+            <a:schemeClr val="accent1"/>
+          </a:fillRef>
+          <a:effectRef idx="0">
+            <a:schemeClr val="accent1"/>
+          </a:effectRef>
+          <a:fontRef idx="minor">
+            <a:schemeClr val="lt1"/>
+          </a:fontRef>
+        </p:style>
+        <p:txBody>
+          <a:bodyPr rtlCol="0" anchor="ctr"/>
+          <a:lstStyle/>
+          <a:p>
+            <a:pPr algn="ctr" eaLnBrk="1" latinLnBrk="0" hangingPunct="1"/>
+            <a:endParaRPr kumimoji="0" lang="en-US" dirty="0"/>
+          </a:p>
+        </p:txBody>
+      </p:sp>
+      <p:sp>
+        <p:nvSpPr>
+          <p:cNvPr id="12" name="Rectangle 11"/>
+          <p:cNvSpPr/>
+          <p:nvPr/>
+        </p:nvSpPr>
+        <p:spPr bwMode="invGray">
+          <a:xfrm>
+            <a:off x="0" y="2602520"/>
+            <a:ext cx="12192000" cy="45720"/>
+          </a:xfrm>
+          <a:prstGeom prst="rect">
+            <a:avLst/>
+          </a:prstGeom>
+          <a:solidFill>
+            <a:srgbClr val="FFFFFF"/>
+          </a:solidFill>
+          <a:ln w="48000" cap="flat" cmpd="thickThin" algn="ctr">
+            <a:noFill/>
+            <a:prstDash val="solid"/>
+          </a:ln>
+          <a:effectLst>
+            <a:outerShdw blurRad="31750" dist="10160" dir="5400000" algn="tl" rotWithShape="0">
+              <a:srgbClr val="000000">
+                <a:alpha val="60000"/>
+              </a:srgbClr>
+            </a:outerShdw>
+          </a:effectLst>
+        </p:spPr>
+        <p:style>
+          <a:lnRef idx="2">
+            <a:schemeClr val="accent1"/>
+          </a:lnRef>
+          <a:fillRef idx="1">
+            <a:schemeClr val="accent1"/>
+          </a:fillRef>
+          <a:effectRef idx="0">
+            <a:schemeClr val="accent1"/>
+          </a:effectRef>
+          <a:fontRef idx="minor">
+            <a:schemeClr val="lt1"/>
+          </a:fontRef>
+        </p:style>
+        <p:txBody>
+          <a:bodyPr rtlCol="0" anchor="ctr"/>
+          <a:lstStyle/>
+          <a:p>
+            <a:pPr algn="ctr" eaLnBrk="1" latinLnBrk="0" hangingPunct="1"/>
+            <a:endParaRPr kumimoji="0" lang="en-US" dirty="0"/>
+          </a:p>
+        </p:txBody>
+      </p:sp>
+      <p:sp>
+        <p:nvSpPr>
           <p:cNvPr id="2" name="Title 1"/>
           <p:cNvSpPr>
             <a:spLocks noGrp="1"/>
@@ -3881,23 +4264,34 @@
         </p:nvSpPr>
         <p:spPr>
           <a:xfrm>
-            <a:off x="831850" y="1709738"/>
-            <a:ext cx="10515600" cy="2852737"/>
+            <a:off x="999744" y="118872"/>
+            <a:ext cx="10684256" cy="1636776"/>
           </a:xfrm>
         </p:spPr>
         <p:txBody>
-          <a:bodyPr anchor="b"/>
+          <a:bodyPr vert="horz" lIns="91440" tIns="0" rIns="91440" bIns="0" rtlCol="0" anchor="b">
+            <a:normAutofit/>
+            <a:scene3d>
+              <a:camera prst="orthographicFront"/>
+              <a:lightRig rig="threePt" dir="t">
+                <a:rot lat="0" lon="0" rev="4800000"/>
+              </a:lightRig>
+            </a:scene3d>
+            <a:sp3d prstMaterial="matte">
+              <a:bevelT w="50800" h="10160"/>
+            </a:sp3d>
+          </a:bodyPr>
           <a:lstStyle>
-            <a:lvl1pPr>
-              <a:defRPr sz="6000"/>
+            <a:lvl1pPr algn="l">
+              <a:defRPr sz="4700" b="1" cap="none" baseline="0"/>
             </a:lvl1pPr>
+            <a:extLst/>
           </a:lstStyle>
           <a:p>
             <a:r>
-              <a:rPr lang="pt-PT"/>
-              <a:t>Clique para editar o estilo</a:t>
-            </a:r>
-            <a:endParaRPr lang="en-US" dirty="0"/>
+              <a:rPr kumimoji="0" lang="en-US"/>
+              <a:t>Click to edit Master title style</a:t>
+            </a:r>
           </a:p>
         </p:txBody>
       </p:sp>
@@ -3913,26 +4307,24 @@
         </p:nvSpPr>
         <p:spPr>
           <a:xfrm>
-            <a:off x="831850" y="4589463"/>
-            <a:ext cx="10515600" cy="1500187"/>
+            <a:off x="987552" y="1828800"/>
+            <a:ext cx="10696448" cy="685800"/>
           </a:xfrm>
         </p:spPr>
         <p:txBody>
-          <a:bodyPr/>
+          <a:bodyPr lIns="146304" tIns="0" rIns="45720" bIns="0" anchor="t"/>
           <a:lstStyle>
             <a:lvl1pPr marL="0" indent="0">
               <a:buNone/>
-              <a:defRPr sz="2400">
+              <a:defRPr sz="2000">
                 <a:solidFill>
-                  <a:schemeClr val="tx1">
-                    <a:tint val="75000"/>
-                  </a:schemeClr>
+                  <a:srgbClr val="FFFFFF"/>
                 </a:solidFill>
               </a:defRPr>
             </a:lvl1pPr>
             <a:lvl2pPr marL="457200" indent="0">
               <a:buNone/>
-              <a:defRPr sz="2000">
+              <a:defRPr sz="1800">
                 <a:solidFill>
                   <a:schemeClr val="tx1">
                     <a:tint val="75000"/>
@@ -3942,7 +4334,7 @@
             </a:lvl2pPr>
             <a:lvl3pPr marL="914400" indent="0">
               <a:buNone/>
-              <a:defRPr sz="1800">
+              <a:defRPr sz="1600">
                 <a:solidFill>
                   <a:schemeClr val="tx1">
                     <a:tint val="75000"/>
@@ -3952,7 +4344,7 @@
             </a:lvl3pPr>
             <a:lvl4pPr marL="1371600" indent="0">
               <a:buNone/>
-              <a:defRPr sz="1600">
+              <a:defRPr sz="1400">
                 <a:solidFill>
                   <a:schemeClr val="tx1">
                     <a:tint val="75000"/>
@@ -3962,7 +4354,7 @@
             </a:lvl4pPr>
             <a:lvl5pPr marL="1828800" indent="0">
               <a:buNone/>
-              <a:defRPr sz="1600">
+              <a:defRPr sz="1400">
                 <a:solidFill>
                   <a:schemeClr val="tx1">
                     <a:tint val="75000"/>
@@ -3972,7 +4364,7 @@
             </a:lvl5pPr>
             <a:lvl6pPr marL="2286000" indent="0">
               <a:buNone/>
-              <a:defRPr sz="1600">
+              <a:defRPr sz="1400">
                 <a:solidFill>
                   <a:schemeClr val="tx1">
                     <a:tint val="75000"/>
@@ -3982,7 +4374,7 @@
             </a:lvl6pPr>
             <a:lvl7pPr marL="2743200" indent="0">
               <a:buNone/>
-              <a:defRPr sz="1600">
+              <a:defRPr sz="1400">
                 <a:solidFill>
                   <a:schemeClr val="tx1">
                     <a:tint val="75000"/>
@@ -3992,7 +4384,7 @@
             </a:lvl7pPr>
             <a:lvl8pPr marL="3200400" indent="0">
               <a:buNone/>
-              <a:defRPr sz="1600">
+              <a:defRPr sz="1400">
                 <a:solidFill>
                   <a:schemeClr val="tx1">
                     <a:tint val="75000"/>
@@ -4002,7 +4394,7 @@
             </a:lvl8pPr>
             <a:lvl9pPr marL="3657600" indent="0">
               <a:buNone/>
-              <a:defRPr sz="1600">
+              <a:defRPr sz="1400">
                 <a:solidFill>
                   <a:schemeClr val="tx1">
                     <a:tint val="75000"/>
@@ -4010,12 +4402,13 @@
                 </a:solidFill>
               </a:defRPr>
             </a:lvl9pPr>
+            <a:extLst/>
           </a:lstStyle>
           <a:p>
-            <a:pPr lvl="0"/>
-            <a:r>
-              <a:rPr lang="pt-PT"/>
-              <a:t>Editar os estilos de texto do Modelo Global</a:t>
+            <a:pPr lvl="0" eaLnBrk="1" latinLnBrk="0" hangingPunct="1"/>
+            <a:r>
+              <a:rPr kumimoji="0" lang="en-US"/>
+              <a:t>Click to edit Master text styles</a:t>
             </a:r>
           </a:p>
         </p:txBody>
@@ -4037,7 +4430,7 @@
           <a:p>
             <a:fld id="{FCC1EC4B-B9B2-4A54-9D21-8609282B1C79}" type="datetimeFigureOut">
               <a:rPr lang="pt-PT" smtClean="0"/>
-              <a:t>25/05/2016</a:t>
+              <a:t>29/05/2016</a:t>
             </a:fld>
             <a:endParaRPr lang="pt-PT"/>
           </a:p>
@@ -4086,21 +4479,16 @@
         </p:txBody>
       </p:sp>
     </p:spTree>
-    <p:extLst>
-      <p:ext uri="{BB962C8B-B14F-4D97-AF65-F5344CB8AC3E}">
-        <p14:creationId xmlns:p14="http://schemas.microsoft.com/office/powerpoint/2010/main" val="3897761695"/>
-      </p:ext>
-    </p:extLst>
   </p:cSld>
   <p:clrMapOvr>
-    <a:masterClrMapping/>
+    <a:overrideClrMapping bg1="dk1" tx1="lt1" bg2="dk2" tx2="lt2" accent1="accent1" accent2="accent2" accent3="accent3" accent4="accent4" accent5="accent5" accent6="accent6" hlink="hlink" folHlink="folHlink"/>
   </p:clrMapOvr>
 </p:sldLayout>
 </file>
 
 <file path=ppt/slideLayouts/slideLayout4.xml><?xml version="1.0" encoding="utf-8"?>
 <p:sldLayout xmlns:a="http://schemas.openxmlformats.org/drawingml/2006/main" xmlns:r="http://schemas.openxmlformats.org/officeDocument/2006/relationships" xmlns:p="http://schemas.openxmlformats.org/presentationml/2006/main" type="twoObj" preserve="1">
-  <p:cSld name="Conteúdo Duplo">
+  <p:cSld name="Two Content">
     <p:spTree>
       <p:nvGrpSpPr>
         <p:cNvPr id="1" name=""/>
@@ -4131,10 +4519,9 @@
           <a:lstStyle/>
           <a:p>
             <a:r>
-              <a:rPr lang="pt-PT"/>
-              <a:t>Clique para editar o estilo</a:t>
-            </a:r>
-            <a:endParaRPr lang="en-US" dirty="0"/>
+              <a:rPr kumimoji="0" lang="en-US"/>
+              <a:t>Click to edit Master title style</a:t>
+            </a:r>
           </a:p>
         </p:txBody>
       </p:sp>
@@ -4150,48 +4537,77 @@
         </p:nvSpPr>
         <p:spPr>
           <a:xfrm>
-            <a:off x="838200" y="1825625"/>
-            <a:ext cx="5181600" cy="4351338"/>
+            <a:off x="609600" y="1773936"/>
+            <a:ext cx="5384800" cy="4623816"/>
           </a:xfrm>
         </p:spPr>
         <p:txBody>
-          <a:bodyPr/>
-          <a:lstStyle/>
-          <a:p>
-            <a:pPr lvl="0"/>
-            <a:r>
-              <a:rPr lang="pt-PT"/>
-              <a:t>Editar os estilos de texto do Modelo Global</a:t>
-            </a:r>
-          </a:p>
-          <a:p>
-            <a:pPr lvl="1"/>
-            <a:r>
-              <a:rPr lang="pt-PT"/>
-              <a:t>Segundo nível</a:t>
-            </a:r>
-          </a:p>
-          <a:p>
-            <a:pPr lvl="2"/>
-            <a:r>
-              <a:rPr lang="pt-PT"/>
-              <a:t>Terceiro nível</a:t>
-            </a:r>
-          </a:p>
-          <a:p>
-            <a:pPr lvl="3"/>
-            <a:r>
-              <a:rPr lang="pt-PT"/>
-              <a:t>Quarto nível</a:t>
-            </a:r>
-          </a:p>
-          <a:p>
-            <a:pPr lvl="4"/>
-            <a:r>
-              <a:rPr lang="pt-PT"/>
-              <a:t>Quinto nível</a:t>
-            </a:r>
-            <a:endParaRPr lang="en-US" dirty="0"/>
+          <a:bodyPr lIns="91440"/>
+          <a:lstStyle>
+            <a:lvl1pPr>
+              <a:defRPr sz="2800"/>
+            </a:lvl1pPr>
+            <a:lvl2pPr>
+              <a:defRPr sz="2400"/>
+            </a:lvl2pPr>
+            <a:lvl3pPr>
+              <a:defRPr sz="2000"/>
+            </a:lvl3pPr>
+            <a:lvl4pPr>
+              <a:defRPr sz="1800"/>
+            </a:lvl4pPr>
+            <a:lvl5pPr>
+              <a:defRPr sz="1800"/>
+            </a:lvl5pPr>
+            <a:lvl6pPr>
+              <a:defRPr sz="1800"/>
+            </a:lvl6pPr>
+            <a:lvl7pPr>
+              <a:defRPr sz="1800"/>
+            </a:lvl7pPr>
+            <a:lvl8pPr>
+              <a:defRPr sz="1800"/>
+            </a:lvl8pPr>
+            <a:lvl9pPr>
+              <a:defRPr sz="1800"/>
+            </a:lvl9pPr>
+            <a:extLst/>
+          </a:lstStyle>
+          <a:p>
+            <a:pPr lvl="0" eaLnBrk="1" latinLnBrk="0" hangingPunct="1"/>
+            <a:r>
+              <a:rPr lang="en-US"/>
+              <a:t>Click to edit Master text styles</a:t>
+            </a:r>
+          </a:p>
+          <a:p>
+            <a:pPr lvl="1" eaLnBrk="1" latinLnBrk="0" hangingPunct="1"/>
+            <a:r>
+              <a:rPr lang="en-US"/>
+              <a:t>Second level</a:t>
+            </a:r>
+          </a:p>
+          <a:p>
+            <a:pPr lvl="2" eaLnBrk="1" latinLnBrk="0" hangingPunct="1"/>
+            <a:r>
+              <a:rPr lang="en-US"/>
+              <a:t>Third level</a:t>
+            </a:r>
+          </a:p>
+          <a:p>
+            <a:pPr lvl="3" eaLnBrk="1" latinLnBrk="0" hangingPunct="1"/>
+            <a:r>
+              <a:rPr lang="en-US"/>
+              <a:t>Fourth level</a:t>
+            </a:r>
+          </a:p>
+          <a:p>
+            <a:pPr lvl="4" eaLnBrk="1" latinLnBrk="0" hangingPunct="1"/>
+            <a:r>
+              <a:rPr lang="en-US"/>
+              <a:t>Fifth level</a:t>
+            </a:r>
+            <a:endParaRPr kumimoji="0" lang="en-US"/>
           </a:p>
         </p:txBody>
       </p:sp>
@@ -4207,48 +4623,77 @@
         </p:nvSpPr>
         <p:spPr>
           <a:xfrm>
-            <a:off x="6172200" y="1825625"/>
-            <a:ext cx="5181600" cy="4351338"/>
+            <a:off x="6197600" y="1773936"/>
+            <a:ext cx="5384800" cy="4623816"/>
           </a:xfrm>
         </p:spPr>
         <p:txBody>
           <a:bodyPr/>
-          <a:lstStyle/>
-          <a:p>
-            <a:pPr lvl="0"/>
-            <a:r>
-              <a:rPr lang="pt-PT"/>
-              <a:t>Editar os estilos de texto do Modelo Global</a:t>
-            </a:r>
-          </a:p>
-          <a:p>
-            <a:pPr lvl="1"/>
-            <a:r>
-              <a:rPr lang="pt-PT"/>
-              <a:t>Segundo nível</a:t>
-            </a:r>
-          </a:p>
-          <a:p>
-            <a:pPr lvl="2"/>
-            <a:r>
-              <a:rPr lang="pt-PT"/>
-              <a:t>Terceiro nível</a:t>
-            </a:r>
-          </a:p>
-          <a:p>
-            <a:pPr lvl="3"/>
-            <a:r>
-              <a:rPr lang="pt-PT"/>
-              <a:t>Quarto nível</a:t>
-            </a:r>
-          </a:p>
-          <a:p>
-            <a:pPr lvl="4"/>
-            <a:r>
-              <a:rPr lang="pt-PT"/>
-              <a:t>Quinto nível</a:t>
-            </a:r>
-            <a:endParaRPr lang="en-US" dirty="0"/>
+          <a:lstStyle>
+            <a:lvl1pPr>
+              <a:defRPr sz="2800"/>
+            </a:lvl1pPr>
+            <a:lvl2pPr>
+              <a:defRPr sz="2400"/>
+            </a:lvl2pPr>
+            <a:lvl3pPr>
+              <a:defRPr sz="2000"/>
+            </a:lvl3pPr>
+            <a:lvl4pPr>
+              <a:defRPr sz="1800"/>
+            </a:lvl4pPr>
+            <a:lvl5pPr>
+              <a:defRPr sz="1800"/>
+            </a:lvl5pPr>
+            <a:lvl6pPr>
+              <a:defRPr sz="1800"/>
+            </a:lvl6pPr>
+            <a:lvl7pPr>
+              <a:defRPr sz="1800"/>
+            </a:lvl7pPr>
+            <a:lvl8pPr>
+              <a:defRPr sz="1800"/>
+            </a:lvl8pPr>
+            <a:lvl9pPr>
+              <a:defRPr sz="1800"/>
+            </a:lvl9pPr>
+            <a:extLst/>
+          </a:lstStyle>
+          <a:p>
+            <a:pPr lvl="0" eaLnBrk="1" latinLnBrk="0" hangingPunct="1"/>
+            <a:r>
+              <a:rPr lang="en-US"/>
+              <a:t>Click to edit Master text styles</a:t>
+            </a:r>
+          </a:p>
+          <a:p>
+            <a:pPr lvl="1" eaLnBrk="1" latinLnBrk="0" hangingPunct="1"/>
+            <a:r>
+              <a:rPr lang="en-US"/>
+              <a:t>Second level</a:t>
+            </a:r>
+          </a:p>
+          <a:p>
+            <a:pPr lvl="2" eaLnBrk="1" latinLnBrk="0" hangingPunct="1"/>
+            <a:r>
+              <a:rPr lang="en-US"/>
+              <a:t>Third level</a:t>
+            </a:r>
+          </a:p>
+          <a:p>
+            <a:pPr lvl="3" eaLnBrk="1" latinLnBrk="0" hangingPunct="1"/>
+            <a:r>
+              <a:rPr lang="en-US"/>
+              <a:t>Fourth level</a:t>
+            </a:r>
+          </a:p>
+          <a:p>
+            <a:pPr lvl="4" eaLnBrk="1" latinLnBrk="0" hangingPunct="1"/>
+            <a:r>
+              <a:rPr lang="en-US"/>
+              <a:t>Fifth level</a:t>
+            </a:r>
+            <a:endParaRPr kumimoji="0" lang="en-US"/>
           </a:p>
         </p:txBody>
       </p:sp>
@@ -4269,7 +4714,7 @@
           <a:p>
             <a:fld id="{FCC1EC4B-B9B2-4A54-9D21-8609282B1C79}" type="datetimeFigureOut">
               <a:rPr lang="pt-PT" smtClean="0"/>
-              <a:t>25/05/2016</a:t>
+              <a:t>29/05/2016</a:t>
             </a:fld>
             <a:endParaRPr lang="pt-PT"/>
           </a:p>
@@ -4318,11 +4763,6 @@
         </p:txBody>
       </p:sp>
     </p:spTree>
-    <p:extLst>
-      <p:ext uri="{BB962C8B-B14F-4D97-AF65-F5344CB8AC3E}">
-        <p14:creationId xmlns:p14="http://schemas.microsoft.com/office/powerpoint/2010/main" val="461131781"/>
-      </p:ext>
-    </p:extLst>
   </p:cSld>
   <p:clrMapOvr>
     <a:masterClrMapping/>
@@ -4332,7 +4772,7 @@
 
 <file path=ppt/slideLayouts/slideLayout5.xml><?xml version="1.0" encoding="utf-8"?>
 <p:sldLayout xmlns:a="http://schemas.openxmlformats.org/drawingml/2006/main" xmlns:r="http://schemas.openxmlformats.org/officeDocument/2006/relationships" xmlns:p="http://schemas.openxmlformats.org/presentationml/2006/main" type="twoTxTwoObj" preserve="1">
-  <p:cSld name="Comparação">
+  <p:cSld name="Comparison">
     <p:spTree>
       <p:nvGrpSpPr>
         <p:cNvPr id="1" name=""/>
@@ -4357,46 +4797,45 @@
             <p:ph type="title"/>
           </p:nvPr>
         </p:nvSpPr>
+        <p:spPr/>
+        <p:txBody>
+          <a:bodyPr/>
+          <a:lstStyle>
+            <a:lvl1pPr>
+              <a:defRPr/>
+            </a:lvl1pPr>
+            <a:extLst/>
+          </a:lstStyle>
+          <a:p>
+            <a:r>
+              <a:rPr kumimoji="0" lang="en-US"/>
+              <a:t>Click to edit Master title style</a:t>
+            </a:r>
+          </a:p>
+        </p:txBody>
+      </p:sp>
+      <p:sp>
+        <p:nvSpPr>
+          <p:cNvPr id="3" name="Text Placeholder 2"/>
+          <p:cNvSpPr>
+            <a:spLocks noGrp="1"/>
+          </p:cNvSpPr>
+          <p:nvPr>
+            <p:ph type="body" idx="1"/>
+          </p:nvPr>
+        </p:nvSpPr>
         <p:spPr>
           <a:xfrm>
-            <a:off x="839788" y="365125"/>
-            <a:ext cx="10515600" cy="1325563"/>
+            <a:off x="609600" y="1698988"/>
+            <a:ext cx="5386917" cy="715355"/>
           </a:xfrm>
         </p:spPr>
         <p:txBody>
-          <a:bodyPr/>
-          <a:lstStyle/>
-          <a:p>
-            <a:r>
-              <a:rPr lang="pt-PT"/>
-              <a:t>Clique para editar o estilo</a:t>
-            </a:r>
-            <a:endParaRPr lang="en-US" dirty="0"/>
-          </a:p>
-        </p:txBody>
-      </p:sp>
-      <p:sp>
-        <p:nvSpPr>
-          <p:cNvPr id="3" name="Text Placeholder 2"/>
-          <p:cNvSpPr>
-            <a:spLocks noGrp="1"/>
-          </p:cNvSpPr>
-          <p:nvPr>
-            <p:ph type="body" idx="1"/>
-          </p:nvPr>
-        </p:nvSpPr>
-        <p:spPr>
-          <a:xfrm>
-            <a:off x="839788" y="1681163"/>
-            <a:ext cx="5157787" cy="823912"/>
-          </a:xfrm>
-        </p:spPr>
-        <p:txBody>
-          <a:bodyPr anchor="b"/>
+          <a:bodyPr lIns="146304" anchor="ctr"/>
           <a:lstStyle>
             <a:lvl1pPr marL="0" indent="0">
               <a:buNone/>
-              <a:defRPr sz="2400" b="1"/>
+              <a:defRPr sz="2300" b="1" cap="all" baseline="0"/>
             </a:lvl1pPr>
             <a:lvl2pPr marL="457200" indent="0">
               <a:buNone/>
@@ -4430,12 +4869,13 @@
               <a:buNone/>
               <a:defRPr sz="1600" b="1"/>
             </a:lvl9pPr>
+            <a:extLst/>
           </a:lstStyle>
           <a:p>
-            <a:pPr lvl="0"/>
-            <a:r>
-              <a:rPr lang="pt-PT"/>
-              <a:t>Editar os estilos de texto do Modelo Global</a:t>
+            <a:pPr lvl="0" eaLnBrk="1" latinLnBrk="0" hangingPunct="1"/>
+            <a:r>
+              <a:rPr kumimoji="0" lang="en-US"/>
+              <a:t>Click to edit Master text styles</a:t>
             </a:r>
           </a:p>
         </p:txBody>
@@ -4452,48 +4892,77 @@
         </p:nvSpPr>
         <p:spPr>
           <a:xfrm>
-            <a:off x="839788" y="2505075"/>
-            <a:ext cx="5157787" cy="3684588"/>
+            <a:off x="609600" y="2449512"/>
+            <a:ext cx="5386917" cy="3951288"/>
           </a:xfrm>
         </p:spPr>
         <p:txBody>
           <a:bodyPr/>
-          <a:lstStyle/>
-          <a:p>
-            <a:pPr lvl="0"/>
-            <a:r>
-              <a:rPr lang="pt-PT"/>
-              <a:t>Editar os estilos de texto do Modelo Global</a:t>
-            </a:r>
-          </a:p>
-          <a:p>
-            <a:pPr lvl="1"/>
-            <a:r>
-              <a:rPr lang="pt-PT"/>
-              <a:t>Segundo nível</a:t>
-            </a:r>
-          </a:p>
-          <a:p>
-            <a:pPr lvl="2"/>
-            <a:r>
-              <a:rPr lang="pt-PT"/>
-              <a:t>Terceiro nível</a:t>
-            </a:r>
-          </a:p>
-          <a:p>
-            <a:pPr lvl="3"/>
-            <a:r>
-              <a:rPr lang="pt-PT"/>
-              <a:t>Quarto nível</a:t>
-            </a:r>
-          </a:p>
-          <a:p>
-            <a:pPr lvl="4"/>
-            <a:r>
-              <a:rPr lang="pt-PT"/>
-              <a:t>Quinto nível</a:t>
-            </a:r>
-            <a:endParaRPr lang="en-US" dirty="0"/>
+          <a:lstStyle>
+            <a:lvl1pPr>
+              <a:defRPr sz="2400"/>
+            </a:lvl1pPr>
+            <a:lvl2pPr>
+              <a:defRPr sz="2000"/>
+            </a:lvl2pPr>
+            <a:lvl3pPr>
+              <a:defRPr sz="1800"/>
+            </a:lvl3pPr>
+            <a:lvl4pPr>
+              <a:defRPr sz="1600"/>
+            </a:lvl4pPr>
+            <a:lvl5pPr>
+              <a:defRPr sz="1600"/>
+            </a:lvl5pPr>
+            <a:lvl6pPr>
+              <a:defRPr sz="1600"/>
+            </a:lvl6pPr>
+            <a:lvl7pPr>
+              <a:defRPr sz="1600"/>
+            </a:lvl7pPr>
+            <a:lvl8pPr>
+              <a:defRPr sz="1600"/>
+            </a:lvl8pPr>
+            <a:lvl9pPr>
+              <a:defRPr sz="1600"/>
+            </a:lvl9pPr>
+            <a:extLst/>
+          </a:lstStyle>
+          <a:p>
+            <a:pPr lvl="0" eaLnBrk="1" latinLnBrk="0" hangingPunct="1"/>
+            <a:r>
+              <a:rPr lang="en-US"/>
+              <a:t>Click to edit Master text styles</a:t>
+            </a:r>
+          </a:p>
+          <a:p>
+            <a:pPr lvl="1" eaLnBrk="1" latinLnBrk="0" hangingPunct="1"/>
+            <a:r>
+              <a:rPr lang="en-US"/>
+              <a:t>Second level</a:t>
+            </a:r>
+          </a:p>
+          <a:p>
+            <a:pPr lvl="2" eaLnBrk="1" latinLnBrk="0" hangingPunct="1"/>
+            <a:r>
+              <a:rPr lang="en-US"/>
+              <a:t>Third level</a:t>
+            </a:r>
+          </a:p>
+          <a:p>
+            <a:pPr lvl="3" eaLnBrk="1" latinLnBrk="0" hangingPunct="1"/>
+            <a:r>
+              <a:rPr lang="en-US"/>
+              <a:t>Fourth level</a:t>
+            </a:r>
+          </a:p>
+          <a:p>
+            <a:pPr lvl="4" eaLnBrk="1" latinLnBrk="0" hangingPunct="1"/>
+            <a:r>
+              <a:rPr lang="en-US"/>
+              <a:t>Fifth level</a:t>
+            </a:r>
+            <a:endParaRPr kumimoji="0" lang="en-US"/>
           </a:p>
         </p:txBody>
       </p:sp>
@@ -4509,16 +4978,16 @@
         </p:nvSpPr>
         <p:spPr>
           <a:xfrm>
-            <a:off x="6172200" y="1681163"/>
-            <a:ext cx="5183188" cy="823912"/>
+            <a:off x="6193368" y="1698988"/>
+            <a:ext cx="5389033" cy="715355"/>
           </a:xfrm>
         </p:spPr>
         <p:txBody>
-          <a:bodyPr anchor="b"/>
+          <a:bodyPr lIns="146304" anchor="ctr"/>
           <a:lstStyle>
             <a:lvl1pPr marL="0" indent="0">
               <a:buNone/>
-              <a:defRPr sz="2400" b="1"/>
+              <a:defRPr sz="2300" b="1" cap="all" baseline="0"/>
             </a:lvl1pPr>
             <a:lvl2pPr marL="457200" indent="0">
               <a:buNone/>
@@ -4552,12 +5021,13 @@
               <a:buNone/>
               <a:defRPr sz="1600" b="1"/>
             </a:lvl9pPr>
+            <a:extLst/>
           </a:lstStyle>
           <a:p>
-            <a:pPr lvl="0"/>
-            <a:r>
-              <a:rPr lang="pt-PT"/>
-              <a:t>Editar os estilos de texto do Modelo Global</a:t>
+            <a:pPr lvl="0" eaLnBrk="1" latinLnBrk="0" hangingPunct="1"/>
+            <a:r>
+              <a:rPr kumimoji="0" lang="en-US"/>
+              <a:t>Click to edit Master text styles</a:t>
             </a:r>
           </a:p>
         </p:txBody>
@@ -4574,48 +5044,77 @@
         </p:nvSpPr>
         <p:spPr>
           <a:xfrm>
-            <a:off x="6172200" y="2505075"/>
-            <a:ext cx="5183188" cy="3684588"/>
+            <a:off x="6193368" y="2449512"/>
+            <a:ext cx="5389033" cy="3951288"/>
           </a:xfrm>
         </p:spPr>
         <p:txBody>
           <a:bodyPr/>
-          <a:lstStyle/>
-          <a:p>
-            <a:pPr lvl="0"/>
-            <a:r>
-              <a:rPr lang="pt-PT"/>
-              <a:t>Editar os estilos de texto do Modelo Global</a:t>
-            </a:r>
-          </a:p>
-          <a:p>
-            <a:pPr lvl="1"/>
-            <a:r>
-              <a:rPr lang="pt-PT"/>
-              <a:t>Segundo nível</a:t>
-            </a:r>
-          </a:p>
-          <a:p>
-            <a:pPr lvl="2"/>
-            <a:r>
-              <a:rPr lang="pt-PT"/>
-              <a:t>Terceiro nível</a:t>
-            </a:r>
-          </a:p>
-          <a:p>
-            <a:pPr lvl="3"/>
-            <a:r>
-              <a:rPr lang="pt-PT"/>
-              <a:t>Quarto nível</a:t>
-            </a:r>
-          </a:p>
-          <a:p>
-            <a:pPr lvl="4"/>
-            <a:r>
-              <a:rPr lang="pt-PT"/>
-              <a:t>Quinto nível</a:t>
-            </a:r>
-            <a:endParaRPr lang="en-US" dirty="0"/>
+          <a:lstStyle>
+            <a:lvl1pPr>
+              <a:defRPr sz="2400"/>
+            </a:lvl1pPr>
+            <a:lvl2pPr>
+              <a:defRPr sz="2000"/>
+            </a:lvl2pPr>
+            <a:lvl3pPr>
+              <a:defRPr sz="1800"/>
+            </a:lvl3pPr>
+            <a:lvl4pPr>
+              <a:defRPr sz="1600"/>
+            </a:lvl4pPr>
+            <a:lvl5pPr>
+              <a:defRPr sz="1600"/>
+            </a:lvl5pPr>
+            <a:lvl6pPr>
+              <a:defRPr sz="1600"/>
+            </a:lvl6pPr>
+            <a:lvl7pPr>
+              <a:defRPr sz="1600"/>
+            </a:lvl7pPr>
+            <a:lvl8pPr>
+              <a:defRPr sz="1600"/>
+            </a:lvl8pPr>
+            <a:lvl9pPr>
+              <a:defRPr sz="1600"/>
+            </a:lvl9pPr>
+            <a:extLst/>
+          </a:lstStyle>
+          <a:p>
+            <a:pPr lvl="0" eaLnBrk="1" latinLnBrk="0" hangingPunct="1"/>
+            <a:r>
+              <a:rPr lang="en-US"/>
+              <a:t>Click to edit Master text styles</a:t>
+            </a:r>
+          </a:p>
+          <a:p>
+            <a:pPr lvl="1" eaLnBrk="1" latinLnBrk="0" hangingPunct="1"/>
+            <a:r>
+              <a:rPr lang="en-US"/>
+              <a:t>Second level</a:t>
+            </a:r>
+          </a:p>
+          <a:p>
+            <a:pPr lvl="2" eaLnBrk="1" latinLnBrk="0" hangingPunct="1"/>
+            <a:r>
+              <a:rPr lang="en-US"/>
+              <a:t>Third level</a:t>
+            </a:r>
+          </a:p>
+          <a:p>
+            <a:pPr lvl="3" eaLnBrk="1" latinLnBrk="0" hangingPunct="1"/>
+            <a:r>
+              <a:rPr lang="en-US"/>
+              <a:t>Fourth level</a:t>
+            </a:r>
+          </a:p>
+          <a:p>
+            <a:pPr lvl="4" eaLnBrk="1" latinLnBrk="0" hangingPunct="1"/>
+            <a:r>
+              <a:rPr lang="en-US"/>
+              <a:t>Fifth level</a:t>
+            </a:r>
+            <a:endParaRPr kumimoji="0" lang="en-US"/>
           </a:p>
         </p:txBody>
       </p:sp>
@@ -4636,7 +5135,7 @@
           <a:p>
             <a:fld id="{FCC1EC4B-B9B2-4A54-9D21-8609282B1C79}" type="datetimeFigureOut">
               <a:rPr lang="pt-PT" smtClean="0"/>
-              <a:t>25/05/2016</a:t>
+              <a:t>29/05/2016</a:t>
             </a:fld>
             <a:endParaRPr lang="pt-PT"/>
           </a:p>
@@ -4685,11 +5184,6 @@
         </p:txBody>
       </p:sp>
     </p:spTree>
-    <p:extLst>
-      <p:ext uri="{BB962C8B-B14F-4D97-AF65-F5344CB8AC3E}">
-        <p14:creationId xmlns:p14="http://schemas.microsoft.com/office/powerpoint/2010/main" val="188329089"/>
-      </p:ext>
-    </p:extLst>
   </p:cSld>
   <p:clrMapOvr>
     <a:masterClrMapping/>
@@ -4699,7 +5193,7 @@
 
 <file path=ppt/slideLayouts/slideLayout6.xml><?xml version="1.0" encoding="utf-8"?>
 <p:sldLayout xmlns:a="http://schemas.openxmlformats.org/drawingml/2006/main" xmlns:r="http://schemas.openxmlformats.org/officeDocument/2006/relationships" xmlns:p="http://schemas.openxmlformats.org/presentationml/2006/main" type="titleOnly" preserve="1">
-  <p:cSld name="Só Título">
+  <p:cSld name="Title Only">
     <p:spTree>
       <p:nvGrpSpPr>
         <p:cNvPr id="1" name=""/>
@@ -4730,10 +5224,9 @@
           <a:lstStyle/>
           <a:p>
             <a:r>
-              <a:rPr lang="pt-PT"/>
-              <a:t>Clique para editar o estilo</a:t>
-            </a:r>
-            <a:endParaRPr lang="en-US" dirty="0"/>
+              <a:rPr kumimoji="0" lang="en-US"/>
+              <a:t>Click to edit Master title style</a:t>
+            </a:r>
           </a:p>
         </p:txBody>
       </p:sp>
@@ -4754,7 +5247,7 @@
           <a:p>
             <a:fld id="{FCC1EC4B-B9B2-4A54-9D21-8609282B1C79}" type="datetimeFigureOut">
               <a:rPr lang="pt-PT" smtClean="0"/>
-              <a:t>25/05/2016</a:t>
+              <a:t>29/05/2016</a:t>
             </a:fld>
             <a:endParaRPr lang="pt-PT"/>
           </a:p>
@@ -4803,11 +5296,6 @@
         </p:txBody>
       </p:sp>
     </p:spTree>
-    <p:extLst>
-      <p:ext uri="{BB962C8B-B14F-4D97-AF65-F5344CB8AC3E}">
-        <p14:creationId xmlns:p14="http://schemas.microsoft.com/office/powerpoint/2010/main" val="2726207304"/>
-      </p:ext>
-    </p:extLst>
   </p:cSld>
   <p:clrMapOvr>
     <a:masterClrMapping/>
@@ -4817,7 +5305,7 @@
 
 <file path=ppt/slideLayouts/slideLayout7.xml><?xml version="1.0" encoding="utf-8"?>
 <p:sldLayout xmlns:a="http://schemas.openxmlformats.org/drawingml/2006/main" xmlns:r="http://schemas.openxmlformats.org/officeDocument/2006/relationships" xmlns:p="http://schemas.openxmlformats.org/presentationml/2006/main" type="blank" preserve="1">
-  <p:cSld name="Em branco">
+  <p:cSld name="Blank">
     <p:spTree>
       <p:nvGrpSpPr>
         <p:cNvPr id="1" name=""/>
@@ -4849,7 +5337,7 @@
           <a:p>
             <a:fld id="{FCC1EC4B-B9B2-4A54-9D21-8609282B1C79}" type="datetimeFigureOut">
               <a:rPr lang="pt-PT" smtClean="0"/>
-              <a:t>25/05/2016</a:t>
+              <a:t>29/05/2016</a:t>
             </a:fld>
             <a:endParaRPr lang="pt-PT"/>
           </a:p>
@@ -4898,11 +5386,6 @@
         </p:txBody>
       </p:sp>
     </p:spTree>
-    <p:extLst>
-      <p:ext uri="{BB962C8B-B14F-4D97-AF65-F5344CB8AC3E}">
-        <p14:creationId xmlns:p14="http://schemas.microsoft.com/office/powerpoint/2010/main" val="2561235251"/>
-      </p:ext>
-    </p:extLst>
   </p:cSld>
   <p:clrMapOvr>
     <a:masterClrMapping/>
@@ -4912,7 +5395,7 @@
 
 <file path=ppt/slideLayouts/slideLayout8.xml><?xml version="1.0" encoding="utf-8"?>
 <p:sldLayout xmlns:a="http://schemas.openxmlformats.org/drawingml/2006/main" xmlns:r="http://schemas.openxmlformats.org/officeDocument/2006/relationships" xmlns:p="http://schemas.openxmlformats.org/presentationml/2006/main" type="objTx" preserve="1">
-  <p:cSld name="Conteúdo com Legenda">
+  <p:cSld name="Content with Caption">
     <p:spTree>
       <p:nvGrpSpPr>
         <p:cNvPr id="1" name=""/>
@@ -4939,23 +5422,26 @@
         </p:nvSpPr>
         <p:spPr>
           <a:xfrm>
-            <a:off x="839788" y="457200"/>
-            <a:ext cx="3932237" cy="1600200"/>
+            <a:off x="223784" y="152400"/>
+            <a:ext cx="3364992" cy="978408"/>
           </a:xfrm>
         </p:spPr>
         <p:txBody>
-          <a:bodyPr anchor="b"/>
+          <a:bodyPr vert="horz" lIns="73152" rIns="45720" bIns="0" rtlCol="0" anchor="b">
+            <a:normAutofit/>
+            <a:sp3d prstMaterial="matte"/>
+          </a:bodyPr>
           <a:lstStyle>
-            <a:lvl1pPr>
-              <a:defRPr sz="3200"/>
+            <a:lvl1pPr algn="l">
+              <a:defRPr sz="2000" b="0"/>
             </a:lvl1pPr>
+            <a:extLst/>
           </a:lstStyle>
           <a:p>
             <a:r>
-              <a:rPr lang="pt-PT"/>
-              <a:t>Clique para editar o estilo</a:t>
-            </a:r>
-            <a:endParaRPr lang="en-US" dirty="0"/>
+              <a:rPr kumimoji="0" lang="en-US"/>
+              <a:t>Click to edit Master title style</a:t>
+            </a:r>
           </a:p>
         </p:txBody>
       </p:sp>
@@ -4971,8 +5457,8 @@
         </p:nvSpPr>
         <p:spPr>
           <a:xfrm>
-            <a:off x="5183188" y="987425"/>
-            <a:ext cx="6172200" cy="4873625"/>
+            <a:off x="4025837" y="1743134"/>
+            <a:ext cx="7894188" cy="4558885"/>
           </a:xfrm>
         </p:spPr>
         <p:txBody>
@@ -5005,42 +5491,43 @@
             <a:lvl9pPr>
               <a:defRPr sz="2000"/>
             </a:lvl9pPr>
+            <a:extLst/>
           </a:lstStyle>
           <a:p>
-            <a:pPr lvl="0"/>
-            <a:r>
-              <a:rPr lang="pt-PT"/>
-              <a:t>Editar os estilos de texto do Modelo Global</a:t>
-            </a:r>
-          </a:p>
-          <a:p>
-            <a:pPr lvl="1"/>
-            <a:r>
-              <a:rPr lang="pt-PT"/>
-              <a:t>Segundo nível</a:t>
-            </a:r>
-          </a:p>
-          <a:p>
-            <a:pPr lvl="2"/>
-            <a:r>
-              <a:rPr lang="pt-PT"/>
-              <a:t>Terceiro nível</a:t>
-            </a:r>
-          </a:p>
-          <a:p>
-            <a:pPr lvl="3"/>
-            <a:r>
-              <a:rPr lang="pt-PT"/>
-              <a:t>Quarto nível</a:t>
-            </a:r>
-          </a:p>
-          <a:p>
-            <a:pPr lvl="4"/>
-            <a:r>
-              <a:rPr lang="pt-PT"/>
-              <a:t>Quinto nível</a:t>
-            </a:r>
-            <a:endParaRPr lang="en-US" dirty="0"/>
+            <a:pPr lvl="0" eaLnBrk="1" latinLnBrk="0" hangingPunct="1"/>
+            <a:r>
+              <a:rPr lang="en-US"/>
+              <a:t>Click to edit Master text styles</a:t>
+            </a:r>
+          </a:p>
+          <a:p>
+            <a:pPr lvl="1" eaLnBrk="1" latinLnBrk="0" hangingPunct="1"/>
+            <a:r>
+              <a:rPr lang="en-US"/>
+              <a:t>Second level</a:t>
+            </a:r>
+          </a:p>
+          <a:p>
+            <a:pPr lvl="2" eaLnBrk="1" latinLnBrk="0" hangingPunct="1"/>
+            <a:r>
+              <a:rPr lang="en-US"/>
+              <a:t>Third level</a:t>
+            </a:r>
+          </a:p>
+          <a:p>
+            <a:pPr lvl="3" eaLnBrk="1" latinLnBrk="0" hangingPunct="1"/>
+            <a:r>
+              <a:rPr lang="en-US"/>
+              <a:t>Fourth level</a:t>
+            </a:r>
+          </a:p>
+          <a:p>
+            <a:pPr lvl="4" eaLnBrk="1" latinLnBrk="0" hangingPunct="1"/>
+            <a:r>
+              <a:rPr lang="en-US"/>
+              <a:t>Fifth level</a:t>
+            </a:r>
+            <a:endParaRPr kumimoji="0" lang="en-US"/>
           </a:p>
         </p:txBody>
       </p:sp>
@@ -5056,8 +5543,8 @@
         </p:nvSpPr>
         <p:spPr>
           <a:xfrm>
-            <a:off x="839788" y="2057400"/>
-            <a:ext cx="3932237" cy="3811588"/>
+            <a:off x="223784" y="1730018"/>
+            <a:ext cx="3291840" cy="4572000"/>
           </a:xfrm>
         </p:spPr>
         <p:txBody>
@@ -5065,46 +5552,47 @@
           <a:lstStyle>
             <a:lvl1pPr marL="0" indent="0">
               <a:buNone/>
-              <a:defRPr sz="1600"/>
+              <a:defRPr sz="1400"/>
             </a:lvl1pPr>
             <a:lvl2pPr marL="457200" indent="0">
               <a:buNone/>
-              <a:defRPr sz="1400"/>
+              <a:defRPr sz="1200"/>
             </a:lvl2pPr>
             <a:lvl3pPr marL="914400" indent="0">
               <a:buNone/>
-              <a:defRPr sz="1200"/>
+              <a:defRPr sz="1000"/>
             </a:lvl3pPr>
             <a:lvl4pPr marL="1371600" indent="0">
               <a:buNone/>
-              <a:defRPr sz="1000"/>
+              <a:defRPr sz="900"/>
             </a:lvl4pPr>
             <a:lvl5pPr marL="1828800" indent="0">
               <a:buNone/>
-              <a:defRPr sz="1000"/>
+              <a:defRPr sz="900"/>
             </a:lvl5pPr>
             <a:lvl6pPr marL="2286000" indent="0">
               <a:buNone/>
-              <a:defRPr sz="1000"/>
+              <a:defRPr sz="900"/>
             </a:lvl6pPr>
             <a:lvl7pPr marL="2743200" indent="0">
               <a:buNone/>
-              <a:defRPr sz="1000"/>
+              <a:defRPr sz="900"/>
             </a:lvl7pPr>
             <a:lvl8pPr marL="3200400" indent="0">
               <a:buNone/>
-              <a:defRPr sz="1000"/>
+              <a:defRPr sz="900"/>
             </a:lvl8pPr>
             <a:lvl9pPr marL="3657600" indent="0">
               <a:buNone/>
-              <a:defRPr sz="1000"/>
+              <a:defRPr sz="900"/>
             </a:lvl9pPr>
+            <a:extLst/>
           </a:lstStyle>
           <a:p>
-            <a:pPr lvl="0"/>
-            <a:r>
-              <a:rPr lang="pt-PT"/>
-              <a:t>Editar os estilos de texto do Modelo Global</a:t>
+            <a:pPr lvl="0" eaLnBrk="1" latinLnBrk="0" hangingPunct="1"/>
+            <a:r>
+              <a:rPr kumimoji="0" lang="en-US"/>
+              <a:t>Click to edit Master text styles</a:t>
             </a:r>
           </a:p>
         </p:txBody>
@@ -5126,7 +5614,7 @@
           <a:p>
             <a:fld id="{FCC1EC4B-B9B2-4A54-9D21-8609282B1C79}" type="datetimeFigureOut">
               <a:rPr lang="pt-PT" smtClean="0"/>
-              <a:t>25/05/2016</a:t>
+              <a:t>29/05/2016</a:t>
             </a:fld>
             <a:endParaRPr lang="pt-PT"/>
           </a:p>
@@ -5174,12 +5662,97 @@
           </a:p>
         </p:txBody>
       </p:sp>
+      <p:sp>
+        <p:nvSpPr>
+          <p:cNvPr id="12" name="Rectangle 11"/>
+          <p:cNvSpPr/>
+          <p:nvPr/>
+        </p:nvSpPr>
+        <p:spPr bwMode="invGray">
+          <a:xfrm>
+            <a:off x="3807649" y="0"/>
+            <a:ext cx="60960" cy="1453896"/>
+          </a:xfrm>
+          <a:prstGeom prst="rect">
+            <a:avLst/>
+          </a:prstGeom>
+          <a:solidFill>
+            <a:srgbClr val="FFFFFF"/>
+          </a:solidFill>
+          <a:ln w="48000" cap="flat" cmpd="thickThin" algn="ctr">
+            <a:noFill/>
+            <a:prstDash val="solid"/>
+          </a:ln>
+        </p:spPr>
+        <p:style>
+          <a:lnRef idx="2">
+            <a:schemeClr val="accent1"/>
+          </a:lnRef>
+          <a:fillRef idx="1">
+            <a:schemeClr val="accent1"/>
+          </a:fillRef>
+          <a:effectRef idx="0">
+            <a:schemeClr val="accent1"/>
+          </a:effectRef>
+          <a:fontRef idx="minor">
+            <a:schemeClr val="lt1"/>
+          </a:fontRef>
+        </p:style>
+        <p:txBody>
+          <a:bodyPr rtlCol="0" anchor="ctr"/>
+          <a:lstStyle/>
+          <a:p>
+            <a:pPr algn="ctr" eaLnBrk="1" latinLnBrk="0" hangingPunct="1"/>
+            <a:endParaRPr kumimoji="0" lang="en-US" dirty="0"/>
+          </a:p>
+        </p:txBody>
+      </p:sp>
+      <p:sp>
+        <p:nvSpPr>
+          <p:cNvPr id="9" name="Rectangle 8"/>
+          <p:cNvSpPr/>
+          <p:nvPr/>
+        </p:nvSpPr>
+        <p:spPr bwMode="invGray">
+          <a:xfrm>
+            <a:off x="3807649" y="0"/>
+            <a:ext cx="60960" cy="1453896"/>
+          </a:xfrm>
+          <a:prstGeom prst="rect">
+            <a:avLst/>
+          </a:prstGeom>
+          <a:solidFill>
+            <a:srgbClr val="FFFFFF"/>
+          </a:solidFill>
+          <a:ln w="48000" cap="flat" cmpd="thickThin" algn="ctr">
+            <a:noFill/>
+            <a:prstDash val="solid"/>
+          </a:ln>
+        </p:spPr>
+        <p:style>
+          <a:lnRef idx="2">
+            <a:schemeClr val="accent1"/>
+          </a:lnRef>
+          <a:fillRef idx="1">
+            <a:schemeClr val="accent1"/>
+          </a:fillRef>
+          <a:effectRef idx="0">
+            <a:schemeClr val="accent1"/>
+          </a:effectRef>
+          <a:fontRef idx="minor">
+            <a:schemeClr val="lt1"/>
+          </a:fontRef>
+        </p:style>
+        <p:txBody>
+          <a:bodyPr rtlCol="0" anchor="ctr"/>
+          <a:lstStyle/>
+          <a:p>
+            <a:pPr algn="ctr" eaLnBrk="1" latinLnBrk="0" hangingPunct="1"/>
+            <a:endParaRPr kumimoji="0" lang="en-US" dirty="0"/>
+          </a:p>
+        </p:txBody>
+      </p:sp>
     </p:spTree>
-    <p:extLst>
-      <p:ext uri="{BB962C8B-B14F-4D97-AF65-F5344CB8AC3E}">
-        <p14:creationId xmlns:p14="http://schemas.microsoft.com/office/powerpoint/2010/main" val="1810931220"/>
-      </p:ext>
-    </p:extLst>
   </p:cSld>
   <p:clrMapOvr>
     <a:masterClrMapping/>
@@ -5189,7 +5762,7 @@
 
 <file path=ppt/slideLayouts/slideLayout9.xml><?xml version="1.0" encoding="utf-8"?>
 <p:sldLayout xmlns:a="http://schemas.openxmlformats.org/drawingml/2006/main" xmlns:r="http://schemas.openxmlformats.org/officeDocument/2006/relationships" xmlns:p="http://schemas.openxmlformats.org/presentationml/2006/main" type="picTx" preserve="1">
-  <p:cSld name="Imagem com Legenda">
+  <p:cSld name="Picture with Caption">
     <p:spTree>
       <p:nvGrpSpPr>
         <p:cNvPr id="1" name=""/>
@@ -5216,23 +5789,25 @@
         </p:nvSpPr>
         <p:spPr>
           <a:xfrm>
-            <a:off x="839788" y="457200"/>
-            <a:ext cx="3932237" cy="1600200"/>
+            <a:off x="219456" y="155448"/>
+            <a:ext cx="3366867" cy="978408"/>
           </a:xfrm>
         </p:spPr>
         <p:txBody>
-          <a:bodyPr anchor="b"/>
+          <a:bodyPr lIns="73152" bIns="0" anchor="b">
+            <a:sp3d prstMaterial="matte"/>
+          </a:bodyPr>
           <a:lstStyle>
-            <a:lvl1pPr>
-              <a:defRPr sz="3200"/>
+            <a:lvl1pPr algn="l">
+              <a:defRPr sz="2000" b="0"/>
             </a:lvl1pPr>
+            <a:extLst/>
           </a:lstStyle>
           <a:p>
             <a:r>
-              <a:rPr lang="pt-PT"/>
-              <a:t>Clique para editar o estilo</a:t>
-            </a:r>
-            <a:endParaRPr lang="en-US" dirty="0"/>
+              <a:rPr kumimoji="0" lang="en-US"/>
+              <a:t>Click to edit Master title style</a:t>
+            </a:r>
           </a:p>
         </p:txBody>
       </p:sp>
@@ -5240,7 +5815,7 @@
         <p:nvSpPr>
           <p:cNvPr id="3" name="Picture Placeholder 2"/>
           <p:cNvSpPr>
-            <a:spLocks noGrp="1" noChangeAspect="1"/>
+            <a:spLocks noGrp="1"/>
           </p:cNvSpPr>
           <p:nvPr>
             <p:ph type="pic" idx="1"/>
@@ -5248,12 +5823,17 @@
         </p:nvSpPr>
         <p:spPr>
           <a:xfrm>
-            <a:off x="5183188" y="987425"/>
-            <a:ext cx="6172200" cy="4873625"/>
+            <a:off x="3871741" y="1484808"/>
+            <a:ext cx="8329863" cy="5373192"/>
           </a:xfrm>
+          <a:solidFill>
+            <a:schemeClr val="bg2">
+              <a:shade val="75000"/>
+            </a:schemeClr>
+          </a:solidFill>
         </p:spPr>
         <p:txBody>
-          <a:bodyPr anchor="t"/>
+          <a:bodyPr/>
           <a:lstStyle>
             <a:lvl1pPr marL="0" indent="0">
               <a:buNone/>
@@ -5291,13 +5871,13 @@
               <a:buNone/>
               <a:defRPr sz="2000"/>
             </a:lvl9pPr>
+            <a:extLst/>
           </a:lstStyle>
           <a:p>
             <a:r>
-              <a:rPr lang="pt-PT"/>
-              <a:t>Clique no ícone para adicionar uma imagem</a:t>
-            </a:r>
-            <a:endParaRPr lang="en-US" dirty="0"/>
+              <a:rPr kumimoji="0" lang="en-US" dirty="0"/>
+              <a:t>Click icon to add picture</a:t>
+            </a:r>
           </a:p>
         </p:txBody>
       </p:sp>
@@ -5313,8 +5893,8 @@
         </p:nvSpPr>
         <p:spPr>
           <a:xfrm>
-            <a:off x="839788" y="2057400"/>
-            <a:ext cx="3932237" cy="3811588"/>
+            <a:off x="219456" y="1728216"/>
+            <a:ext cx="3291840" cy="4572000"/>
           </a:xfrm>
         </p:spPr>
         <p:txBody>
@@ -5322,46 +5902,47 @@
           <a:lstStyle>
             <a:lvl1pPr marL="0" indent="0">
               <a:buNone/>
-              <a:defRPr sz="1600"/>
+              <a:defRPr sz="1400"/>
             </a:lvl1pPr>
             <a:lvl2pPr marL="457200" indent="0">
               <a:buNone/>
-              <a:defRPr sz="1400"/>
+              <a:defRPr sz="1200"/>
             </a:lvl2pPr>
             <a:lvl3pPr marL="914400" indent="0">
               <a:buNone/>
-              <a:defRPr sz="1200"/>
+              <a:defRPr sz="1000"/>
             </a:lvl3pPr>
             <a:lvl4pPr marL="1371600" indent="0">
               <a:buNone/>
-              <a:defRPr sz="1000"/>
+              <a:defRPr sz="900"/>
             </a:lvl4pPr>
             <a:lvl5pPr marL="1828800" indent="0">
               <a:buNone/>
-              <a:defRPr sz="1000"/>
+              <a:defRPr sz="900"/>
             </a:lvl5pPr>
             <a:lvl6pPr marL="2286000" indent="0">
               <a:buNone/>
-              <a:defRPr sz="1000"/>
+              <a:defRPr sz="900"/>
             </a:lvl6pPr>
             <a:lvl7pPr marL="2743200" indent="0">
               <a:buNone/>
-              <a:defRPr sz="1000"/>
+              <a:defRPr sz="900"/>
             </a:lvl7pPr>
             <a:lvl8pPr marL="3200400" indent="0">
               <a:buNone/>
-              <a:defRPr sz="1000"/>
+              <a:defRPr sz="900"/>
             </a:lvl8pPr>
             <a:lvl9pPr marL="3657600" indent="0">
               <a:buNone/>
-              <a:defRPr sz="1000"/>
+              <a:defRPr sz="900"/>
             </a:lvl9pPr>
+            <a:extLst/>
           </a:lstStyle>
           <a:p>
-            <a:pPr lvl="0"/>
-            <a:r>
-              <a:rPr lang="pt-PT"/>
-              <a:t>Editar os estilos de texto do Modelo Global</a:t>
+            <a:pPr lvl="0" eaLnBrk="1" latinLnBrk="0" hangingPunct="1"/>
+            <a:r>
+              <a:rPr kumimoji="0" lang="en-US"/>
+              <a:t>Click to edit Master text styles</a:t>
             </a:r>
           </a:p>
         </p:txBody>
@@ -5376,14 +5957,19 @@
             <p:ph type="dt" sz="half" idx="10"/>
           </p:nvPr>
         </p:nvSpPr>
-        <p:spPr/>
+        <p:spPr>
+          <a:xfrm>
+            <a:off x="219456" y="1170432"/>
+            <a:ext cx="3364992" cy="201168"/>
+          </a:xfrm>
+        </p:spPr>
         <p:txBody>
           <a:bodyPr/>
           <a:lstStyle/>
           <a:p>
             <a:fld id="{FCC1EC4B-B9B2-4A54-9D21-8609282B1C79}" type="datetimeFigureOut">
               <a:rPr lang="pt-PT" smtClean="0"/>
-              <a:t>25/05/2016</a:t>
+              <a:t>29/05/2016</a:t>
             </a:fld>
             <a:endParaRPr lang="pt-PT"/>
           </a:p>
@@ -5391,6 +5977,96 @@
       </p:sp>
       <p:sp>
         <p:nvSpPr>
+          <p:cNvPr id="11" name="Rectangle 10"/>
+          <p:cNvSpPr/>
+          <p:nvPr/>
+        </p:nvSpPr>
+        <p:spPr>
+          <a:xfrm>
+            <a:off x="3807649" y="0"/>
+            <a:ext cx="60960" cy="6858000"/>
+          </a:xfrm>
+          <a:prstGeom prst="rect">
+            <a:avLst/>
+          </a:prstGeom>
+          <a:solidFill>
+            <a:srgbClr val="FFFFFF"/>
+          </a:solidFill>
+          <a:ln w="48000" cap="flat" cmpd="thickThin" algn="ctr">
+            <a:noFill/>
+            <a:prstDash val="solid"/>
+          </a:ln>
+        </p:spPr>
+        <p:style>
+          <a:lnRef idx="2">
+            <a:schemeClr val="accent1"/>
+          </a:lnRef>
+          <a:fillRef idx="1">
+            <a:schemeClr val="accent1"/>
+          </a:fillRef>
+          <a:effectRef idx="0">
+            <a:schemeClr val="accent1"/>
+          </a:effectRef>
+          <a:fontRef idx="minor">
+            <a:schemeClr val="lt1"/>
+          </a:fontRef>
+        </p:style>
+        <p:txBody>
+          <a:bodyPr rtlCol="0" anchor="ctr"/>
+          <a:lstStyle/>
+          <a:p>
+            <a:pPr algn="ctr" eaLnBrk="1" latinLnBrk="0" hangingPunct="1"/>
+            <a:endParaRPr kumimoji="0" lang="en-US" dirty="0"/>
+          </a:p>
+        </p:txBody>
+      </p:sp>
+      <p:sp>
+        <p:nvSpPr>
+          <p:cNvPr id="9" name="Rectangle 8"/>
+          <p:cNvSpPr/>
+          <p:nvPr/>
+        </p:nvSpPr>
+        <p:spPr bwMode="invGray">
+          <a:xfrm>
+            <a:off x="3807649" y="0"/>
+            <a:ext cx="60960" cy="6858000"/>
+          </a:xfrm>
+          <a:prstGeom prst="rect">
+            <a:avLst/>
+          </a:prstGeom>
+          <a:solidFill>
+            <a:srgbClr val="FFFFFF"/>
+          </a:solidFill>
+          <a:ln w="48000" cap="flat" cmpd="thickThin" algn="ctr">
+            <a:noFill/>
+            <a:prstDash val="solid"/>
+          </a:ln>
+        </p:spPr>
+        <p:style>
+          <a:lnRef idx="2">
+            <a:schemeClr val="accent1"/>
+          </a:lnRef>
+          <a:fillRef idx="1">
+            <a:schemeClr val="accent1"/>
+          </a:fillRef>
+          <a:effectRef idx="0">
+            <a:schemeClr val="accent1"/>
+          </a:effectRef>
+          <a:fontRef idx="minor">
+            <a:schemeClr val="lt1"/>
+          </a:fontRef>
+        </p:style>
+        <p:txBody>
+          <a:bodyPr rtlCol="0" anchor="ctr"/>
+          <a:lstStyle/>
+          <a:p>
+            <a:pPr algn="ctr" eaLnBrk="1" latinLnBrk="0" hangingPunct="1"/>
+            <a:endParaRPr kumimoji="0" lang="en-US" dirty="0"/>
+          </a:p>
+        </p:txBody>
+      </p:sp>
+      <p:sp>
+        <p:nvSpPr>
           <p:cNvPr id="6" name="Footer Placeholder 5"/>
           <p:cNvSpPr>
             <a:spLocks noGrp="1"/>
@@ -5399,10 +6075,25 @@
             <p:ph type="ftr" sz="quarter" idx="11"/>
           </p:nvPr>
         </p:nvSpPr>
-        <p:spPr/>
+        <p:spPr>
+          <a:xfrm>
+            <a:off x="4047744" y="1170432"/>
+            <a:ext cx="6925056" cy="201168"/>
+          </a:xfrm>
+        </p:spPr>
         <p:txBody>
           <a:bodyPr/>
-          <a:lstStyle/>
+          <a:lstStyle>
+            <a:lvl1pPr>
+              <a:defRPr>
+                <a:solidFill>
+                  <a:schemeClr val="bg1">
+                    <a:shade val="50000"/>
+                  </a:schemeClr>
+                </a:solidFill>
+              </a:defRPr>
+            </a:lvl1pPr>
+          </a:lstStyle>
           <a:p>
             <a:endParaRPr lang="pt-PT"/>
           </a:p>
@@ -5418,7 +6109,12 @@
             <p:ph type="sldNum" sz="quarter" idx="12"/>
           </p:nvPr>
         </p:nvSpPr>
-        <p:spPr/>
+        <p:spPr>
+          <a:xfrm>
+            <a:off x="11119104" y="1170432"/>
+            <a:ext cx="978485" cy="201168"/>
+          </a:xfrm>
+        </p:spPr>
         <p:txBody>
           <a:bodyPr/>
           <a:lstStyle/>
@@ -5432,14 +6128,9 @@
         </p:txBody>
       </p:sp>
     </p:spTree>
-    <p:extLst>
-      <p:ext uri="{BB962C8B-B14F-4D97-AF65-F5344CB8AC3E}">
-        <p14:creationId xmlns:p14="http://schemas.microsoft.com/office/powerpoint/2010/main" val="4171350812"/>
-      </p:ext>
-    </p:extLst>
   </p:cSld>
   <p:clrMapOvr>
-    <a:masterClrMapping/>
+    <a:overrideClrMapping bg1="lt1" tx1="dk1" bg2="lt2" tx2="dk2" accent1="accent1" accent2="accent2" accent3="accent3" accent4="accent4" accent5="accent5" accent6="accent6" hlink="hlink" folHlink="folHlink"/>
   </p:clrMapOvr>
 </p:sldLayout>
 </file>
@@ -5448,9 +6139,19 @@
 <p:sldMaster xmlns:a="http://schemas.openxmlformats.org/drawingml/2006/main" xmlns:r="http://schemas.openxmlformats.org/officeDocument/2006/relationships" xmlns:p="http://schemas.openxmlformats.org/presentationml/2006/main">
   <p:cSld>
     <p:bg>
-      <p:bgRef idx="1001">
-        <a:schemeClr val="bg1"/>
-      </p:bgRef>
+      <p:bgPr>
+        <a:blipFill dpi="0" rotWithShape="1">
+          <a:blip r:embed="rId13">
+            <a:alphaModFix amt="10000"/>
+            <a:lum/>
+          </a:blip>
+          <a:srcRect/>
+          <a:stretch>
+            <a:fillRect/>
+          </a:stretch>
+        </a:blipFill>
+        <a:effectLst/>
+      </p:bgPr>
     </p:bg>
     <p:spTree>
       <p:nvGrpSpPr>
@@ -5468,6 +6169,103 @@
       </p:grpSpPr>
       <p:sp>
         <p:nvSpPr>
+          <p:cNvPr id="10" name="Rectangle 9"/>
+          <p:cNvSpPr/>
+          <p:nvPr/>
+        </p:nvSpPr>
+        <p:spPr bwMode="invGray">
+          <a:xfrm>
+            <a:off x="0" y="1435895"/>
+            <a:ext cx="12192000" cy="45720"/>
+          </a:xfrm>
+          <a:prstGeom prst="rect">
+            <a:avLst/>
+          </a:prstGeom>
+          <a:solidFill>
+            <a:srgbClr val="FFFFFF"/>
+          </a:solidFill>
+          <a:ln w="48000" cap="flat" cmpd="thickThin" algn="ctr">
+            <a:noFill/>
+            <a:prstDash val="solid"/>
+          </a:ln>
+          <a:effectLst>
+            <a:outerShdw blurRad="31750" dist="10160" dir="5400000" algn="tl" rotWithShape="0">
+              <a:srgbClr val="000000">
+                <a:alpha val="60000"/>
+              </a:srgbClr>
+            </a:outerShdw>
+          </a:effectLst>
+        </p:spPr>
+        <p:style>
+          <a:lnRef idx="2">
+            <a:schemeClr val="accent1"/>
+          </a:lnRef>
+          <a:fillRef idx="1">
+            <a:schemeClr val="accent1"/>
+          </a:fillRef>
+          <a:effectRef idx="0">
+            <a:schemeClr val="accent1"/>
+          </a:effectRef>
+          <a:fontRef idx="minor">
+            <a:schemeClr val="lt1"/>
+          </a:fontRef>
+        </p:style>
+        <p:txBody>
+          <a:bodyPr rtlCol="0" anchor="ctr"/>
+          <a:lstStyle/>
+          <a:p>
+            <a:pPr algn="ctr" eaLnBrk="1" latinLnBrk="0" hangingPunct="1"/>
+            <a:endParaRPr kumimoji="0" lang="en-US" dirty="0"/>
+          </a:p>
+        </p:txBody>
+      </p:sp>
+      <p:sp>
+        <p:nvSpPr>
+          <p:cNvPr id="7" name="Rectangle 6"/>
+          <p:cNvSpPr/>
+          <p:nvPr/>
+        </p:nvSpPr>
+        <p:spPr bwMode="ltGray">
+          <a:xfrm>
+            <a:off x="1" y="1"/>
+            <a:ext cx="12191999" cy="1433733"/>
+          </a:xfrm>
+          <a:prstGeom prst="rect">
+            <a:avLst/>
+          </a:prstGeom>
+          <a:solidFill>
+            <a:srgbClr val="000000"/>
+          </a:solidFill>
+          <a:ln w="48000" cap="flat" cmpd="thickThin" algn="ctr">
+            <a:noFill/>
+            <a:prstDash val="solid"/>
+          </a:ln>
+        </p:spPr>
+        <p:style>
+          <a:lnRef idx="2">
+            <a:schemeClr val="accent1"/>
+          </a:lnRef>
+          <a:fillRef idx="1">
+            <a:schemeClr val="accent1"/>
+          </a:fillRef>
+          <a:effectRef idx="0">
+            <a:schemeClr val="accent1"/>
+          </a:effectRef>
+          <a:fontRef idx="minor">
+            <a:schemeClr val="lt1"/>
+          </a:fontRef>
+        </p:style>
+        <p:txBody>
+          <a:bodyPr rtlCol="0" anchor="ctr"/>
+          <a:lstStyle/>
+          <a:p>
+            <a:pPr algn="ctr" eaLnBrk="1" latinLnBrk="0" hangingPunct="1"/>
+            <a:endParaRPr kumimoji="0" lang="en-US" dirty="0"/>
+          </a:p>
+        </p:txBody>
+      </p:sp>
+      <p:sp>
+        <p:nvSpPr>
           <p:cNvPr id="2" name="Title Placeholder 1"/>
           <p:cNvSpPr>
             <a:spLocks noGrp="1"/>
@@ -5478,24 +6276,32 @@
         </p:nvSpPr>
         <p:spPr>
           <a:xfrm>
-            <a:off x="838200" y="365125"/>
-            <a:ext cx="10515600" cy="1325563"/>
+            <a:off x="609600" y="152400"/>
+            <a:ext cx="10972800" cy="1251062"/>
           </a:xfrm>
           <a:prstGeom prst="rect">
             <a:avLst/>
           </a:prstGeom>
         </p:spPr>
         <p:txBody>
-          <a:bodyPr vert="horz" lIns="91440" tIns="45720" rIns="91440" bIns="45720" rtlCol="0" anchor="ctr">
+          <a:bodyPr vert="horz" lIns="91440" rIns="45720" rtlCol="0" anchor="ctr">
             <a:normAutofit/>
+            <a:scene3d>
+              <a:camera prst="orthographicFront"/>
+              <a:lightRig rig="threePt" dir="t">
+                <a:rot lat="0" lon="0" rev="4800000"/>
+              </a:lightRig>
+            </a:scene3d>
+            <a:sp3d prstMaterial="matte">
+              <a:bevelT w="50800" h="10160"/>
+            </a:sp3d>
           </a:bodyPr>
           <a:lstStyle/>
           <a:p>
             <a:r>
-              <a:rPr lang="pt-PT"/>
-              <a:t>Clique para editar o estilo</a:t>
-            </a:r>
-            <a:endParaRPr lang="en-US" dirty="0"/>
+              <a:rPr kumimoji="0" lang="en-US"/>
+              <a:t>Click to edit Master title style</a:t>
+            </a:r>
           </a:p>
         </p:txBody>
       </p:sp>
@@ -5511,53 +6317,52 @@
         </p:nvSpPr>
         <p:spPr>
           <a:xfrm>
-            <a:off x="838200" y="1825625"/>
-            <a:ext cx="10515600" cy="4351338"/>
+            <a:off x="609600" y="1775192"/>
+            <a:ext cx="10972800" cy="4625609"/>
           </a:xfrm>
           <a:prstGeom prst="rect">
             <a:avLst/>
           </a:prstGeom>
         </p:spPr>
         <p:txBody>
-          <a:bodyPr vert="horz" lIns="91440" tIns="45720" rIns="91440" bIns="45720" rtlCol="0">
+          <a:bodyPr vert="horz" lIns="54864" tIns="91440" rtlCol="0">
             <a:normAutofit/>
           </a:bodyPr>
           <a:lstStyle/>
           <a:p>
-            <a:pPr lvl="0"/>
-            <a:r>
-              <a:rPr lang="pt-PT"/>
-              <a:t>Editar os estilos de texto do Modelo Global</a:t>
-            </a:r>
-          </a:p>
-          <a:p>
-            <a:pPr lvl="1"/>
-            <a:r>
-              <a:rPr lang="pt-PT"/>
-              <a:t>Segundo nível</a:t>
-            </a:r>
-          </a:p>
-          <a:p>
-            <a:pPr lvl="2"/>
-            <a:r>
-              <a:rPr lang="pt-PT"/>
-              <a:t>Terceiro nível</a:t>
-            </a:r>
-          </a:p>
-          <a:p>
-            <a:pPr lvl="3"/>
-            <a:r>
-              <a:rPr lang="pt-PT"/>
-              <a:t>Quarto nível</a:t>
-            </a:r>
-          </a:p>
-          <a:p>
-            <a:pPr lvl="4"/>
-            <a:r>
-              <a:rPr lang="pt-PT"/>
-              <a:t>Quinto nível</a:t>
-            </a:r>
-            <a:endParaRPr lang="en-US" dirty="0"/>
+            <a:pPr lvl="0" eaLnBrk="1" latinLnBrk="0" hangingPunct="1"/>
+            <a:r>
+              <a:rPr kumimoji="0" lang="en-US"/>
+              <a:t>Click to edit Master text styles</a:t>
+            </a:r>
+          </a:p>
+          <a:p>
+            <a:pPr lvl="1" eaLnBrk="1" latinLnBrk="0" hangingPunct="1"/>
+            <a:r>
+              <a:rPr kumimoji="0" lang="en-US"/>
+              <a:t>Second level</a:t>
+            </a:r>
+          </a:p>
+          <a:p>
+            <a:pPr lvl="2" eaLnBrk="1" latinLnBrk="0" hangingPunct="1"/>
+            <a:r>
+              <a:rPr kumimoji="0" lang="en-US"/>
+              <a:t>Third level</a:t>
+            </a:r>
+          </a:p>
+          <a:p>
+            <a:pPr lvl="3" eaLnBrk="1" latinLnBrk="0" hangingPunct="1"/>
+            <a:r>
+              <a:rPr kumimoji="0" lang="en-US"/>
+              <a:t>Fourth level</a:t>
+            </a:r>
+          </a:p>
+          <a:p>
+            <a:pPr lvl="4" eaLnBrk="1" latinLnBrk="0" hangingPunct="1"/>
+            <a:r>
+              <a:rPr kumimoji="0" lang="en-US"/>
+              <a:t>Fifth level</a:t>
+            </a:r>
           </a:p>
         </p:txBody>
       </p:sp>
@@ -5573,30 +6378,31 @@
         </p:nvSpPr>
         <p:spPr>
           <a:xfrm>
-            <a:off x="838200" y="6356350"/>
-            <a:ext cx="2743200" cy="365125"/>
+            <a:off x="609600" y="6476999"/>
+            <a:ext cx="2844800" cy="274320"/>
           </a:xfrm>
           <a:prstGeom prst="rect">
             <a:avLst/>
           </a:prstGeom>
         </p:spPr>
         <p:txBody>
-          <a:bodyPr vert="horz" lIns="91440" tIns="45720" rIns="91440" bIns="45720" rtlCol="0" anchor="ctr"/>
+          <a:bodyPr vert="horz" lIns="109728" rIns="45720" bIns="0" rtlCol="0" anchor="b"/>
           <a:lstStyle>
-            <a:lvl1pPr algn="l">
-              <a:defRPr sz="1200">
+            <a:lvl1pPr algn="l" eaLnBrk="1" latinLnBrk="0" hangingPunct="1">
+              <a:defRPr kumimoji="0" sz="1200">
                 <a:solidFill>
                   <a:schemeClr val="tx1">
-                    <a:tint val="75000"/>
+                    <a:tint val="95000"/>
                   </a:schemeClr>
                 </a:solidFill>
               </a:defRPr>
             </a:lvl1pPr>
+            <a:extLst/>
           </a:lstStyle>
           <a:p>
             <a:fld id="{FCC1EC4B-B9B2-4A54-9D21-8609282B1C79}" type="datetimeFigureOut">
               <a:rPr lang="pt-PT" smtClean="0"/>
-              <a:t>25/05/2016</a:t>
+              <a:t>29/05/2016</a:t>
             </a:fld>
             <a:endParaRPr lang="pt-PT"/>
           </a:p>
@@ -5614,25 +6420,26 @@
         </p:nvSpPr>
         <p:spPr>
           <a:xfrm>
-            <a:off x="4038600" y="6356350"/>
-            <a:ext cx="4114800" cy="365125"/>
+            <a:off x="3520796" y="6476999"/>
+            <a:ext cx="7343625" cy="274320"/>
           </a:xfrm>
           <a:prstGeom prst="rect">
             <a:avLst/>
           </a:prstGeom>
         </p:spPr>
         <p:txBody>
-          <a:bodyPr vert="horz" lIns="91440" tIns="45720" rIns="91440" bIns="45720" rtlCol="0" anchor="ctr"/>
+          <a:bodyPr vert="horz" lIns="45720" rIns="45720" bIns="0" rtlCol="0" anchor="b"/>
           <a:lstStyle>
-            <a:lvl1pPr algn="ctr">
-              <a:defRPr sz="1200">
+            <a:lvl1pPr algn="l" eaLnBrk="1" latinLnBrk="0" hangingPunct="1">
+              <a:defRPr kumimoji="0" sz="1200">
                 <a:solidFill>
                   <a:schemeClr val="tx1">
-                    <a:tint val="75000"/>
+                    <a:tint val="95000"/>
                   </a:schemeClr>
                 </a:solidFill>
               </a:defRPr>
             </a:lvl1pPr>
+            <a:extLst/>
           </a:lstStyle>
           <a:p>
             <a:endParaRPr lang="pt-PT"/>
@@ -5651,25 +6458,26 @@
         </p:nvSpPr>
         <p:spPr>
           <a:xfrm>
-            <a:off x="8610600" y="6356350"/>
-            <a:ext cx="2743200" cy="365125"/>
+            <a:off x="10939195" y="6476999"/>
+            <a:ext cx="978485" cy="274320"/>
           </a:xfrm>
           <a:prstGeom prst="rect">
             <a:avLst/>
           </a:prstGeom>
         </p:spPr>
         <p:txBody>
-          <a:bodyPr vert="horz" lIns="91440" tIns="45720" rIns="91440" bIns="45720" rtlCol="0" anchor="ctr"/>
+          <a:bodyPr vert="horz" bIns="0" rtlCol="0" anchor="b"/>
           <a:lstStyle>
-            <a:lvl1pPr algn="r">
-              <a:defRPr sz="1200">
+            <a:lvl1pPr algn="r" eaLnBrk="1" latinLnBrk="0" hangingPunct="1">
+              <a:defRPr kumimoji="0" sz="1200">
                 <a:solidFill>
                   <a:schemeClr val="tx1">
-                    <a:tint val="75000"/>
+                    <a:tint val="95000"/>
                   </a:schemeClr>
                 </a:solidFill>
               </a:defRPr>
             </a:lvl1pPr>
+            <a:extLst/>
           </a:lstStyle>
           <a:p>
             <a:fld id="{B083F949-E4DC-46F6-AE35-602DD1C713AD}" type="slidenum">
@@ -5681,57 +6489,54 @@
         </p:txBody>
       </p:sp>
     </p:spTree>
-    <p:extLst>
-      <p:ext uri="{BB962C8B-B14F-4D97-AF65-F5344CB8AC3E}">
-        <p14:creationId xmlns:p14="http://schemas.microsoft.com/office/powerpoint/2010/main" val="850908743"/>
-      </p:ext>
-    </p:extLst>
   </p:cSld>
   <p:clrMap bg1="lt1" tx1="dk1" bg2="lt2" tx2="dk2" accent1="accent1" accent2="accent2" accent3="accent3" accent4="accent4" accent5="accent5" accent6="accent6" hlink="hlink" folHlink="folHlink"/>
   <p:sldLayoutIdLst>
-    <p:sldLayoutId id="2147483661" r:id="rId1"/>
-    <p:sldLayoutId id="2147483662" r:id="rId2"/>
-    <p:sldLayoutId id="2147483663" r:id="rId3"/>
-    <p:sldLayoutId id="2147483664" r:id="rId4"/>
-    <p:sldLayoutId id="2147483665" r:id="rId5"/>
-    <p:sldLayoutId id="2147483666" r:id="rId6"/>
-    <p:sldLayoutId id="2147483667" r:id="rId7"/>
-    <p:sldLayoutId id="2147483668" r:id="rId8"/>
-    <p:sldLayoutId id="2147483669" r:id="rId9"/>
-    <p:sldLayoutId id="2147483670" r:id="rId10"/>
-    <p:sldLayoutId id="2147483671" r:id="rId11"/>
+    <p:sldLayoutId id="2147483673" r:id="rId1"/>
+    <p:sldLayoutId id="2147483674" r:id="rId2"/>
+    <p:sldLayoutId id="2147483675" r:id="rId3"/>
+    <p:sldLayoutId id="2147483676" r:id="rId4"/>
+    <p:sldLayoutId id="2147483677" r:id="rId5"/>
+    <p:sldLayoutId id="2147483678" r:id="rId6"/>
+    <p:sldLayoutId id="2147483679" r:id="rId7"/>
+    <p:sldLayoutId id="2147483680" r:id="rId8"/>
+    <p:sldLayoutId id="2147483681" r:id="rId9"/>
+    <p:sldLayoutId id="2147483682" r:id="rId10"/>
+    <p:sldLayoutId id="2147483683" r:id="rId11"/>
   </p:sldLayoutIdLst>
   <p:txStyles>
     <p:titleStyle>
-      <a:lvl1pPr algn="l" defTabSz="914400" rtl="0" eaLnBrk="1" latinLnBrk="0" hangingPunct="1">
-        <a:lnSpc>
-          <a:spcPct val="90000"/>
-        </a:lnSpc>
+      <a:lvl1pPr algn="l" rtl="0" eaLnBrk="1" latinLnBrk="0" hangingPunct="1">
         <a:spcBef>
           <a:spcPct val="0"/>
         </a:spcBef>
         <a:buNone/>
-        <a:defRPr sz="4400" kern="1200">
+        <a:defRPr kumimoji="0" sz="4500" b="1" kern="1200">
           <a:solidFill>
-            <a:schemeClr val="tx1"/>
+            <a:schemeClr val="accent1">
+              <a:satMod val="150000"/>
+            </a:schemeClr>
           </a:solidFill>
+          <a:effectLst/>
           <a:latin typeface="+mj-lt"/>
           <a:ea typeface="+mj-ea"/>
           <a:cs typeface="+mj-cs"/>
         </a:defRPr>
       </a:lvl1pPr>
+      <a:extLst/>
     </p:titleStyle>
     <p:bodyStyle>
-      <a:lvl1pPr marL="228600" indent="-228600" algn="l" defTabSz="914400" rtl="0" eaLnBrk="1" latinLnBrk="0" hangingPunct="1">
-        <a:lnSpc>
-          <a:spcPct val="90000"/>
-        </a:lnSpc>
+      <a:lvl1pPr marL="438912" indent="-320040" algn="l" rtl="0" eaLnBrk="1" latinLnBrk="0" hangingPunct="1">
         <a:spcBef>
-          <a:spcPts val="1000"/>
+          <a:spcPts val="0"/>
         </a:spcBef>
-        <a:buFont typeface="Arial" panose="020B0604020202020204" pitchFamily="34" charset="0"/>
-        <a:buChar char="•"/>
-        <a:defRPr sz="2800" kern="1200">
+        <a:buClr>
+          <a:schemeClr val="accent1"/>
+        </a:buClr>
+        <a:buSzPct val="80000"/>
+        <a:buFont typeface="Wingdings 2"/>
+        <a:buChar char=""/>
+        <a:defRPr kumimoji="0" sz="3200" kern="1200">
           <a:solidFill>
             <a:schemeClr val="tx1"/>
           </a:solidFill>
@@ -5740,16 +6545,17 @@
           <a:cs typeface="+mn-cs"/>
         </a:defRPr>
       </a:lvl1pPr>
-      <a:lvl2pPr marL="685800" indent="-228600" algn="l" defTabSz="914400" rtl="0" eaLnBrk="1" latinLnBrk="0" hangingPunct="1">
-        <a:lnSpc>
-          <a:spcPct val="90000"/>
-        </a:lnSpc>
+      <a:lvl2pPr marL="731520" indent="-274320" algn="l" rtl="0" eaLnBrk="1" latinLnBrk="0" hangingPunct="1">
         <a:spcBef>
-          <a:spcPts val="500"/>
+          <a:spcPct val="20000"/>
         </a:spcBef>
-        <a:buFont typeface="Arial" panose="020B0604020202020204" pitchFamily="34" charset="0"/>
-        <a:buChar char="•"/>
-        <a:defRPr sz="2400" kern="1200">
+        <a:buClr>
+          <a:schemeClr val="accent2"/>
+        </a:buClr>
+        <a:buSzPct val="90000"/>
+        <a:buFont typeface="Wingdings"/>
+        <a:buChar char=""/>
+        <a:defRPr kumimoji="0" sz="2800" kern="1200">
           <a:solidFill>
             <a:schemeClr val="tx1"/>
           </a:solidFill>
@@ -5758,16 +6564,16 @@
           <a:cs typeface="+mn-cs"/>
         </a:defRPr>
       </a:lvl2pPr>
-      <a:lvl3pPr marL="1143000" indent="-228600" algn="l" defTabSz="914400" rtl="0" eaLnBrk="1" latinLnBrk="0" hangingPunct="1">
-        <a:lnSpc>
-          <a:spcPct val="90000"/>
-        </a:lnSpc>
+      <a:lvl3pPr marL="996696" indent="-228600" algn="l" rtl="0" eaLnBrk="1" latinLnBrk="0" hangingPunct="1">
         <a:spcBef>
-          <a:spcPts val="500"/>
+          <a:spcPct val="20000"/>
         </a:spcBef>
-        <a:buFont typeface="Arial" panose="020B0604020202020204" pitchFamily="34" charset="0"/>
-        <a:buChar char="•"/>
-        <a:defRPr sz="2000" kern="1200">
+        <a:buClr>
+          <a:schemeClr val="accent3"/>
+        </a:buClr>
+        <a:buFont typeface="Arial"/>
+        <a:buChar char="▪"/>
+        <a:defRPr kumimoji="0" sz="2400" kern="1200">
           <a:solidFill>
             <a:schemeClr val="tx1"/>
           </a:solidFill>
@@ -5776,16 +6582,16 @@
           <a:cs typeface="+mn-cs"/>
         </a:defRPr>
       </a:lvl3pPr>
-      <a:lvl4pPr marL="1600200" indent="-228600" algn="l" defTabSz="914400" rtl="0" eaLnBrk="1" latinLnBrk="0" hangingPunct="1">
-        <a:lnSpc>
-          <a:spcPct val="90000"/>
-        </a:lnSpc>
+      <a:lvl4pPr marL="1216152" indent="-182880" algn="l" rtl="0" eaLnBrk="1" latinLnBrk="0" hangingPunct="1">
         <a:spcBef>
-          <a:spcPts val="500"/>
+          <a:spcPct val="20000"/>
         </a:spcBef>
-        <a:buFont typeface="Arial" panose="020B0604020202020204" pitchFamily="34" charset="0"/>
-        <a:buChar char="•"/>
-        <a:defRPr sz="1800" kern="1200">
+        <a:buClr>
+          <a:schemeClr val="accent4"/>
+        </a:buClr>
+        <a:buFont typeface="Arial"/>
+        <a:buChar char="▪"/>
+        <a:defRPr kumimoji="0" sz="2000" kern="1200">
           <a:solidFill>
             <a:schemeClr val="tx1"/>
           </a:solidFill>
@@ -5794,16 +6600,16 @@
           <a:cs typeface="+mn-cs"/>
         </a:defRPr>
       </a:lvl4pPr>
-      <a:lvl5pPr marL="2057400" indent="-228600" algn="l" defTabSz="914400" rtl="0" eaLnBrk="1" latinLnBrk="0" hangingPunct="1">
-        <a:lnSpc>
-          <a:spcPct val="90000"/>
-        </a:lnSpc>
+      <a:lvl5pPr marL="1426464" indent="-182880" algn="l" rtl="0" eaLnBrk="1" latinLnBrk="0" hangingPunct="1">
         <a:spcBef>
-          <a:spcPts val="500"/>
+          <a:spcPct val="20000"/>
         </a:spcBef>
-        <a:buFont typeface="Arial" panose="020B0604020202020204" pitchFamily="34" charset="0"/>
-        <a:buChar char="•"/>
-        <a:defRPr sz="1800" kern="1200">
+        <a:buClr>
+          <a:schemeClr val="accent5"/>
+        </a:buClr>
+        <a:buFont typeface="Wingdings 3"/>
+        <a:buChar char=""/>
+        <a:defRPr kumimoji="0" lang="en-US" sz="2000" kern="1200" smtClean="0">
           <a:solidFill>
             <a:schemeClr val="tx1"/>
           </a:solidFill>
@@ -5812,16 +6618,17 @@
           <a:cs typeface="+mn-cs"/>
         </a:defRPr>
       </a:lvl5pPr>
-      <a:lvl6pPr marL="2514600" indent="-228600" algn="l" defTabSz="914400" rtl="0" eaLnBrk="1" latinLnBrk="0" hangingPunct="1">
-        <a:lnSpc>
-          <a:spcPct val="90000"/>
-        </a:lnSpc>
+      <a:lvl6pPr marL="1627632" indent="-182880" algn="l" rtl="0" eaLnBrk="1" latinLnBrk="0" hangingPunct="1">
         <a:spcBef>
-          <a:spcPts val="500"/>
+          <a:spcPct val="20000"/>
         </a:spcBef>
-        <a:buFont typeface="Arial" panose="020B0604020202020204" pitchFamily="34" charset="0"/>
-        <a:buChar char="•"/>
-        <a:defRPr sz="1800" kern="1200">
+        <a:buClr>
+          <a:schemeClr val="accent6"/>
+        </a:buClr>
+        <a:buSzPct val="100000"/>
+        <a:buFont typeface="Wingdings 2"/>
+        <a:buChar char=""/>
+        <a:defRPr kumimoji="0" sz="2000" kern="1200">
           <a:solidFill>
             <a:schemeClr val="tx1"/>
           </a:solidFill>
@@ -5830,16 +6637,17 @@
           <a:cs typeface="+mn-cs"/>
         </a:defRPr>
       </a:lvl6pPr>
-      <a:lvl7pPr marL="2971800" indent="-228600" algn="l" defTabSz="914400" rtl="0" eaLnBrk="1" latinLnBrk="0" hangingPunct="1">
-        <a:lnSpc>
-          <a:spcPct val="90000"/>
-        </a:lnSpc>
+      <a:lvl7pPr marL="1828800" indent="-182880" algn="l" rtl="0" eaLnBrk="1" latinLnBrk="0" hangingPunct="1">
         <a:spcBef>
-          <a:spcPts val="500"/>
+          <a:spcPct val="20000"/>
         </a:spcBef>
-        <a:buFont typeface="Arial" panose="020B0604020202020204" pitchFamily="34" charset="0"/>
-        <a:buChar char="•"/>
-        <a:defRPr sz="1800" kern="1200">
+        <a:buClr>
+          <a:schemeClr val="accent1"/>
+        </a:buClr>
+        <a:buSzPct val="100000"/>
+        <a:buFont typeface="Wingdings 2"/>
+        <a:buChar char=""/>
+        <a:defRPr kumimoji="0" sz="1800" kern="1200">
           <a:solidFill>
             <a:schemeClr val="tx1"/>
           </a:solidFill>
@@ -5848,16 +6656,16 @@
           <a:cs typeface="+mn-cs"/>
         </a:defRPr>
       </a:lvl7pPr>
-      <a:lvl8pPr marL="3429000" indent="-228600" algn="l" defTabSz="914400" rtl="0" eaLnBrk="1" latinLnBrk="0" hangingPunct="1">
-        <a:lnSpc>
-          <a:spcPct val="90000"/>
-        </a:lnSpc>
+      <a:lvl8pPr marL="2029968" indent="-182880" algn="l" rtl="0" eaLnBrk="1" latinLnBrk="0" hangingPunct="1">
         <a:spcBef>
-          <a:spcPts val="500"/>
+          <a:spcPct val="20000"/>
         </a:spcBef>
-        <a:buFont typeface="Arial" panose="020B0604020202020204" pitchFamily="34" charset="0"/>
-        <a:buChar char="•"/>
-        <a:defRPr sz="1800" kern="1200">
+        <a:buClr>
+          <a:schemeClr val="accent2"/>
+        </a:buClr>
+        <a:buFont typeface="Wingdings 2" pitchFamily="18" charset="2"/>
+        <a:buChar char=""/>
+        <a:defRPr kumimoji="0" sz="1800" kern="1200">
           <a:solidFill>
             <a:schemeClr val="tx1"/>
           </a:solidFill>
@@ -5866,16 +6674,16 @@
           <a:cs typeface="+mn-cs"/>
         </a:defRPr>
       </a:lvl8pPr>
-      <a:lvl9pPr marL="3886200" indent="-228600" algn="l" defTabSz="914400" rtl="0" eaLnBrk="1" latinLnBrk="0" hangingPunct="1">
-        <a:lnSpc>
-          <a:spcPct val="90000"/>
-        </a:lnSpc>
+      <a:lvl9pPr marL="2231136" indent="-182880" algn="l" rtl="0" eaLnBrk="1" latinLnBrk="0" hangingPunct="1">
         <a:spcBef>
-          <a:spcPts val="500"/>
+          <a:spcPct val="20000"/>
         </a:spcBef>
-        <a:buFont typeface="Arial" panose="020B0604020202020204" pitchFamily="34" charset="0"/>
-        <a:buChar char="•"/>
-        <a:defRPr sz="1800" kern="1200">
+        <a:buClr>
+          <a:schemeClr val="accent3"/>
+        </a:buClr>
+        <a:buFont typeface="Wingdings 2" pitchFamily="18" charset="2"/>
+        <a:buChar char=""/>
+        <a:defRPr kumimoji="0" sz="1800" kern="1200" baseline="0">
           <a:solidFill>
             <a:schemeClr val="tx1"/>
           </a:solidFill>
@@ -5884,13 +6692,11 @@
           <a:cs typeface="+mn-cs"/>
         </a:defRPr>
       </a:lvl9pPr>
+      <a:extLst/>
     </p:bodyStyle>
     <p:otherStyle>
-      <a:defPPr>
-        <a:defRPr lang="en-US"/>
-      </a:defPPr>
-      <a:lvl1pPr marL="0" algn="l" defTabSz="914400" rtl="0" eaLnBrk="1" latinLnBrk="0" hangingPunct="1">
-        <a:defRPr sz="1800" kern="1200">
+      <a:lvl1pPr marL="0" algn="l" rtl="0" eaLnBrk="1" latinLnBrk="0" hangingPunct="1">
+        <a:defRPr kumimoji="0" kern="1200">
           <a:solidFill>
             <a:schemeClr val="tx1"/>
           </a:solidFill>
@@ -5899,8 +6705,8 @@
           <a:cs typeface="+mn-cs"/>
         </a:defRPr>
       </a:lvl1pPr>
-      <a:lvl2pPr marL="457200" algn="l" defTabSz="914400" rtl="0" eaLnBrk="1" latinLnBrk="0" hangingPunct="1">
-        <a:defRPr sz="1800" kern="1200">
+      <a:lvl2pPr marL="457200" algn="l" rtl="0" eaLnBrk="1" latinLnBrk="0" hangingPunct="1">
+        <a:defRPr kumimoji="0" kern="1200">
           <a:solidFill>
             <a:schemeClr val="tx1"/>
           </a:solidFill>
@@ -5909,8 +6715,8 @@
           <a:cs typeface="+mn-cs"/>
         </a:defRPr>
       </a:lvl2pPr>
-      <a:lvl3pPr marL="914400" algn="l" defTabSz="914400" rtl="0" eaLnBrk="1" latinLnBrk="0" hangingPunct="1">
-        <a:defRPr sz="1800" kern="1200">
+      <a:lvl3pPr marL="914400" algn="l" rtl="0" eaLnBrk="1" latinLnBrk="0" hangingPunct="1">
+        <a:defRPr kumimoji="0" kern="1200">
           <a:solidFill>
             <a:schemeClr val="tx1"/>
           </a:solidFill>
@@ -5919,8 +6725,8 @@
           <a:cs typeface="+mn-cs"/>
         </a:defRPr>
       </a:lvl3pPr>
-      <a:lvl4pPr marL="1371600" algn="l" defTabSz="914400" rtl="0" eaLnBrk="1" latinLnBrk="0" hangingPunct="1">
-        <a:defRPr sz="1800" kern="1200">
+      <a:lvl4pPr marL="1371600" algn="l" rtl="0" eaLnBrk="1" latinLnBrk="0" hangingPunct="1">
+        <a:defRPr kumimoji="0" kern="1200">
           <a:solidFill>
             <a:schemeClr val="tx1"/>
           </a:solidFill>
@@ -5929,8 +6735,8 @@
           <a:cs typeface="+mn-cs"/>
         </a:defRPr>
       </a:lvl4pPr>
-      <a:lvl5pPr marL="1828800" algn="l" defTabSz="914400" rtl="0" eaLnBrk="1" latinLnBrk="0" hangingPunct="1">
-        <a:defRPr sz="1800" kern="1200">
+      <a:lvl5pPr marL="1828800" algn="l" rtl="0" eaLnBrk="1" latinLnBrk="0" hangingPunct="1">
+        <a:defRPr kumimoji="0" kern="1200">
           <a:solidFill>
             <a:schemeClr val="tx1"/>
           </a:solidFill>
@@ -5939,8 +6745,8 @@
           <a:cs typeface="+mn-cs"/>
         </a:defRPr>
       </a:lvl5pPr>
-      <a:lvl6pPr marL="2286000" algn="l" defTabSz="914400" rtl="0" eaLnBrk="1" latinLnBrk="0" hangingPunct="1">
-        <a:defRPr sz="1800" kern="1200">
+      <a:lvl6pPr marL="2286000" algn="l" rtl="0" eaLnBrk="1" latinLnBrk="0" hangingPunct="1">
+        <a:defRPr kumimoji="0" kern="1200">
           <a:solidFill>
             <a:schemeClr val="tx1"/>
           </a:solidFill>
@@ -5949,8 +6755,8 @@
           <a:cs typeface="+mn-cs"/>
         </a:defRPr>
       </a:lvl6pPr>
-      <a:lvl7pPr marL="2743200" algn="l" defTabSz="914400" rtl="0" eaLnBrk="1" latinLnBrk="0" hangingPunct="1">
-        <a:defRPr sz="1800" kern="1200">
+      <a:lvl7pPr marL="2743200" algn="l" rtl="0" eaLnBrk="1" latinLnBrk="0" hangingPunct="1">
+        <a:defRPr kumimoji="0" kern="1200">
           <a:solidFill>
             <a:schemeClr val="tx1"/>
           </a:solidFill>
@@ -5959,8 +6765,8 @@
           <a:cs typeface="+mn-cs"/>
         </a:defRPr>
       </a:lvl7pPr>
-      <a:lvl8pPr marL="3200400" algn="l" defTabSz="914400" rtl="0" eaLnBrk="1" latinLnBrk="0" hangingPunct="1">
-        <a:defRPr sz="1800" kern="1200">
+      <a:lvl8pPr marL="3200400" algn="l" rtl="0" eaLnBrk="1" latinLnBrk="0" hangingPunct="1">
+        <a:defRPr kumimoji="0" kern="1200">
           <a:solidFill>
             <a:schemeClr val="tx1"/>
           </a:solidFill>
@@ -5969,8 +6775,8 @@
           <a:cs typeface="+mn-cs"/>
         </a:defRPr>
       </a:lvl8pPr>
-      <a:lvl9pPr marL="3657600" algn="l" defTabSz="914400" rtl="0" eaLnBrk="1" latinLnBrk="0" hangingPunct="1">
-        <a:defRPr sz="1800" kern="1200">
+      <a:lvl9pPr marL="3657600" algn="l" rtl="0" eaLnBrk="1" latinLnBrk="0" hangingPunct="1">
+        <a:defRPr kumimoji="0" kern="1200">
           <a:solidFill>
             <a:schemeClr val="tx1"/>
           </a:solidFill>
@@ -5979,6 +6785,7 @@
           <a:cs typeface="+mn-cs"/>
         </a:defRPr>
       </a:lvl9pPr>
+      <a:extLst/>
     </p:otherStyle>
   </p:txStyles>
 </p:sldMaster>
@@ -6050,6 +6857,76 @@
               <a:rPr lang="pt-PT" dirty="0"/>
               <a:t> for Java</a:t>
             </a:r>
+          </a:p>
+        </p:txBody>
+      </p:sp>
+      <p:pic>
+        <p:nvPicPr>
+          <p:cNvPr id="4" name="Picture 3"/>
+          <p:cNvPicPr>
+            <a:picLocks noChangeAspect="1"/>
+          </p:cNvPicPr>
+          <p:nvPr/>
+        </p:nvPicPr>
+        <p:blipFill>
+          <a:blip r:embed="rId2" cstate="print">
+            <a:extLst>
+              <a:ext uri="{28A0092B-C50C-407E-A947-70E740481C1C}">
+                <a14:useLocalDpi xmlns:a14="http://schemas.microsoft.com/office/drawing/2010/main" val="0"/>
+              </a:ext>
+            </a:extLst>
+          </a:blip>
+          <a:stretch>
+            <a:fillRect/>
+          </a:stretch>
+        </p:blipFill>
+        <p:spPr>
+          <a:xfrm>
+            <a:off x="6996686" y="1379621"/>
+            <a:ext cx="4322108" cy="2588876"/>
+          </a:xfrm>
+          <a:prstGeom prst="rect">
+            <a:avLst/>
+          </a:prstGeom>
+        </p:spPr>
+      </p:pic>
+      <p:sp>
+        <p:nvSpPr>
+          <p:cNvPr id="6" name="TextBox 5"/>
+          <p:cNvSpPr txBox="1"/>
+          <p:nvPr/>
+        </p:nvSpPr>
+        <p:spPr>
+          <a:xfrm>
+            <a:off x="8758989" y="6296164"/>
+            <a:ext cx="3433011" cy="369332"/>
+          </a:xfrm>
+          <a:prstGeom prst="rect">
+            <a:avLst/>
+          </a:prstGeom>
+          <a:noFill/>
+        </p:spPr>
+        <p:txBody>
+          <a:bodyPr wrap="square" rtlCol="0">
+            <a:spAutoFit/>
+          </a:bodyPr>
+          <a:lstStyle/>
+          <a:p>
+            <a:r>
+              <a:rPr lang="pt-PT" dirty="0">
+                <a:solidFill>
+                  <a:schemeClr val="bg1"/>
+                </a:solidFill>
+                <a:latin typeface="Consolas" panose="020B0609020204030204" pitchFamily="49" charset="0"/>
+              </a:rPr>
+              <a:t>Arquitectura de Software</a:t>
+            </a:r>
+            <a:endParaRPr lang="en-GB" dirty="0">
+              <a:solidFill>
+                <a:schemeClr val="bg1"/>
+              </a:solidFill>
+              <a:latin typeface="Consolas" panose="020B0609020204030204" pitchFamily="49" charset="0"/>
+            </a:endParaRPr>
           </a:p>
         </p:txBody>
       </p:sp>
@@ -6659,9 +7536,14 @@
         </p:blipFill>
         <p:spPr>
           <a:xfrm>
-            <a:off x="3367881" y="1690688"/>
-            <a:ext cx="5456237" cy="4807650"/>
+            <a:off x="3470974" y="1774825"/>
+            <a:ext cx="5250052" cy="4625975"/>
           </a:xfrm>
+          <a:ln w="22225">
+            <a:solidFill>
+              <a:schemeClr val="tx1"/>
+            </a:solidFill>
+          </a:ln>
         </p:spPr>
       </p:pic>
     </p:spTree>
@@ -6818,9 +7700,14 @@
         </p:blipFill>
         <p:spPr>
           <a:xfrm>
-            <a:off x="2851902" y="1267685"/>
-            <a:ext cx="6121616" cy="5393935"/>
+            <a:off x="3061225" y="1583418"/>
+            <a:ext cx="5763288" cy="5078202"/>
           </a:xfrm>
+          <a:ln w="25400">
+            <a:solidFill>
+              <a:schemeClr val="tx1"/>
+            </a:solidFill>
+          </a:ln>
         </p:spPr>
       </p:pic>
     </p:spTree>
@@ -6924,9 +7811,14 @@
         </p:blipFill>
         <p:spPr>
           <a:xfrm>
-            <a:off x="3605212" y="2001044"/>
+            <a:off x="3605212" y="2087562"/>
             <a:ext cx="4981575" cy="4000500"/>
           </a:xfrm>
+          <a:ln w="25400">
+            <a:solidFill>
+              <a:schemeClr val="tx1"/>
+            </a:solidFill>
+          </a:ln>
         </p:spPr>
       </p:pic>
     </p:spTree>
@@ -7083,9 +7975,14 @@
         </p:blipFill>
         <p:spPr>
           <a:xfrm>
-            <a:off x="4233519" y="1242397"/>
-            <a:ext cx="3407145" cy="5615603"/>
+            <a:off x="4351663" y="1551986"/>
+            <a:ext cx="3145782" cy="5184829"/>
           </a:xfrm>
+          <a:ln w="25400">
+            <a:solidFill>
+              <a:schemeClr val="tx1"/>
+            </a:solidFill>
+          </a:ln>
         </p:spPr>
       </p:pic>
     </p:spTree>
@@ -7390,9 +8287,14 @@
         </p:blipFill>
         <p:spPr>
           <a:xfrm>
-            <a:off x="4323676" y="1221191"/>
-            <a:ext cx="3544648" cy="5526128"/>
+            <a:off x="4428647" y="1652530"/>
+            <a:ext cx="3197306" cy="4984620"/>
           </a:xfrm>
+          <a:ln w="25400">
+            <a:solidFill>
+              <a:schemeClr val="tx1"/>
+            </a:solidFill>
+          </a:ln>
         </p:spPr>
       </p:pic>
     </p:spTree>
@@ -7740,9 +8642,14 @@
         </p:blipFill>
         <p:spPr>
           <a:xfrm>
-            <a:off x="218251" y="1905392"/>
-            <a:ext cx="11755497" cy="4200939"/>
+            <a:off x="609600" y="2127195"/>
+            <a:ext cx="10972800" cy="3921235"/>
           </a:xfrm>
+          <a:ln w="25400">
+            <a:solidFill>
+              <a:schemeClr val="tx1"/>
+            </a:solidFill>
+          </a:ln>
         </p:spPr>
       </p:pic>
     </p:spTree>
@@ -8013,7 +8920,12 @@
             <p:ph idx="1"/>
           </p:nvPr>
         </p:nvSpPr>
-        <p:spPr/>
+        <p:spPr>
+          <a:xfrm>
+            <a:off x="609600" y="2015824"/>
+            <a:ext cx="10972800" cy="4625609"/>
+          </a:xfrm>
+        </p:spPr>
         <p:txBody>
           <a:bodyPr/>
           <a:lstStyle/>
@@ -8299,6 +9211,11 @@
             <a:off x="2875050" y="2180969"/>
             <a:ext cx="6441899" cy="3491411"/>
           </a:xfrm>
+          <a:ln w="25400">
+            <a:solidFill>
+              <a:schemeClr val="tx1"/>
+            </a:solidFill>
+          </a:ln>
         </p:spPr>
       </p:pic>
     </p:spTree>
@@ -8794,9 +9711,14 @@
         </p:blipFill>
         <p:spPr>
           <a:xfrm>
-            <a:off x="3859078" y="1012073"/>
+            <a:off x="4163877" y="1605631"/>
             <a:ext cx="3837122" cy="5127583"/>
           </a:xfrm>
+          <a:ln w="25400">
+            <a:solidFill>
+              <a:schemeClr val="tx1"/>
+            </a:solidFill>
+          </a:ln>
         </p:spPr>
       </p:pic>
     </p:spTree>
@@ -8866,7 +9788,12 @@
             <p:ph idx="1"/>
           </p:nvPr>
         </p:nvSpPr>
-        <p:spPr/>
+        <p:spPr>
+          <a:xfrm>
+            <a:off x="609600" y="2096034"/>
+            <a:ext cx="10972800" cy="4625609"/>
+          </a:xfrm>
+        </p:spPr>
         <p:txBody>
           <a:bodyPr/>
           <a:lstStyle/>
@@ -9107,25 +10034,6 @@
           </a:p>
         </p:txBody>
       </p:sp>
-      <p:sp>
-        <p:nvSpPr>
-          <p:cNvPr id="3" name="Marcador de Posição de Conteúdo 2"/>
-          <p:cNvSpPr>
-            <a:spLocks noGrp="1"/>
-          </p:cNvSpPr>
-          <p:nvPr>
-            <p:ph idx="1"/>
-          </p:nvPr>
-        </p:nvSpPr>
-        <p:spPr/>
-        <p:txBody>
-          <a:bodyPr/>
-          <a:lstStyle/>
-          <a:p>
-            <a:endParaRPr lang="pt-PT"/>
-          </a:p>
-        </p:txBody>
-      </p:sp>
       <p:pic>
         <p:nvPicPr>
           <p:cNvPr id="4" name="Imagem 3"/>
@@ -9148,12 +10056,17 @@
         </p:blipFill>
         <p:spPr>
           <a:xfrm>
-            <a:off x="972457" y="1483794"/>
-            <a:ext cx="10247086" cy="5374206"/>
+            <a:off x="1068710" y="1572127"/>
+            <a:ext cx="10247086" cy="5237746"/>
           </a:xfrm>
           <a:prstGeom prst="rect">
             <a:avLst/>
           </a:prstGeom>
+          <a:ln w="25400">
+            <a:solidFill>
+              <a:schemeClr val="tx1"/>
+            </a:solidFill>
+          </a:ln>
         </p:spPr>
       </p:pic>
     </p:spTree>
@@ -9474,9 +10387,14 @@
         </p:blipFill>
         <p:spPr>
           <a:xfrm>
-            <a:off x="0" y="1690688"/>
+            <a:off x="32084" y="1770898"/>
             <a:ext cx="12113546" cy="4623112"/>
           </a:xfrm>
+          <a:ln w="25400">
+            <a:solidFill>
+              <a:schemeClr val="tx1"/>
+            </a:solidFill>
+          </a:ln>
         </p:spPr>
       </p:pic>
     </p:spTree>
@@ -9563,9 +10481,14 @@
         </p:blipFill>
         <p:spPr>
           <a:xfrm>
-            <a:off x="3764070" y="2109854"/>
-            <a:ext cx="5286941" cy="3905919"/>
+            <a:off x="4291012" y="2754312"/>
+            <a:ext cx="3609975" cy="2667000"/>
           </a:xfrm>
+          <a:ln w="25400">
+            <a:solidFill>
+              <a:schemeClr val="tx1"/>
+            </a:solidFill>
+          </a:ln>
         </p:spPr>
       </p:pic>
     </p:spTree>
@@ -9582,9 +10505,9 @@
 </file>
 
 <file path=ppt/theme/theme1.xml><?xml version="1.0" encoding="utf-8"?>
-<a:theme xmlns:a="http://schemas.openxmlformats.org/drawingml/2006/main" name="Tema do Office">
+<a:theme xmlns:a="http://schemas.openxmlformats.org/drawingml/2006/main" name="Module">
   <a:themeElements>
-    <a:clrScheme name="Tema do Office">
+    <a:clrScheme name="Module">
       <a:dk1>
         <a:sysClr val="windowText" lastClr="000000"/>
       </a:dk1>
@@ -9592,52 +10515,52 @@
         <a:sysClr val="window" lastClr="FFFFFF"/>
       </a:lt1>
       <a:dk2>
-        <a:srgbClr val="44546A"/>
+        <a:srgbClr val="5A6378"/>
       </a:dk2>
       <a:lt2>
-        <a:srgbClr val="E7E6E6"/>
+        <a:srgbClr val="D4D4D6"/>
       </a:lt2>
       <a:accent1>
-        <a:srgbClr val="5B9BD5"/>
+        <a:srgbClr val="F0AD00"/>
       </a:accent1>
       <a:accent2>
-        <a:srgbClr val="ED7D31"/>
+        <a:srgbClr val="60B5CC"/>
       </a:accent2>
       <a:accent3>
-        <a:srgbClr val="A5A5A5"/>
+        <a:srgbClr val="E66C7D"/>
       </a:accent3>
       <a:accent4>
-        <a:srgbClr val="FFC000"/>
+        <a:srgbClr val="6BB76D"/>
       </a:accent4>
       <a:accent5>
-        <a:srgbClr val="4472C4"/>
+        <a:srgbClr val="E88651"/>
       </a:accent5>
       <a:accent6>
-        <a:srgbClr val="70AD47"/>
+        <a:srgbClr val="C64847"/>
       </a:accent6>
       <a:hlink>
-        <a:srgbClr val="0563C1"/>
+        <a:srgbClr val="168BBA"/>
       </a:hlink>
       <a:folHlink>
-        <a:srgbClr val="954F72"/>
+        <a:srgbClr val="680000"/>
       </a:folHlink>
     </a:clrScheme>
-    <a:fontScheme name="Tema do Office">
+    <a:fontScheme name="Module">
       <a:majorFont>
-        <a:latin typeface="Calibri Light" panose="020F0302020204030204"/>
+        <a:latin typeface="Corbel"/>
         <a:ea typeface=""/>
         <a:cs typeface=""/>
-        <a:font script="Jpan" typeface="游ゴシック Light"/>
-        <a:font script="Hang" typeface="맑은 고딕"/>
-        <a:font script="Hans" typeface="等线 Light"/>
+        <a:font script="Jpan" typeface="HGｺﾞｼｯｸM"/>
+        <a:font script="Hang" typeface="HY엽서L"/>
+        <a:font script="Hans" typeface="华文楷体"/>
         <a:font script="Hant" typeface="新細明體"/>
-        <a:font script="Arab" typeface="Times New Roman"/>
-        <a:font script="Hebr" typeface="Times New Roman"/>
-        <a:font script="Thai" typeface="Angsana New"/>
+        <a:font script="Arab" typeface="Tahoma"/>
+        <a:font script="Hebr" typeface="Miriam"/>
+        <a:font script="Thai" typeface="DilleniaUPC"/>
         <a:font script="Ethi" typeface="Nyala"/>
         <a:font script="Beng" typeface="Vrinda"/>
         <a:font script="Gujr" typeface="Shruti"/>
-        <a:font script="Khmr" typeface="MoolBoran"/>
+        <a:font script="Khmr" typeface="DaunPenh"/>
         <a:font script="Knda" typeface="Tunga"/>
         <a:font script="Guru" typeface="Raavi"/>
         <a:font script="Cans" typeface="Euphemia"/>
@@ -9654,21 +10577,21 @@
         <a:font script="Laoo" typeface="DokChampa"/>
         <a:font script="Sinh" typeface="Iskoola Pota"/>
         <a:font script="Mong" typeface="Mongolian Baiti"/>
-        <a:font script="Viet" typeface="Times New Roman"/>
+        <a:font script="Viet" typeface="Arial"/>
         <a:font script="Uigh" typeface="Microsoft Uighur"/>
         <a:font script="Geor" typeface="Sylfaen"/>
       </a:majorFont>
       <a:minorFont>
-        <a:latin typeface="Calibri" panose="020F0502020204030204"/>
+        <a:latin typeface="Corbel"/>
         <a:ea typeface=""/>
         <a:cs typeface=""/>
-        <a:font script="Jpan" typeface="游ゴシック"/>
-        <a:font script="Hang" typeface="맑은 고딕"/>
-        <a:font script="Hans" typeface="等线"/>
+        <a:font script="Jpan" typeface="HGｺﾞｼｯｸM"/>
+        <a:font script="Hang" typeface="HY엽서L"/>
+        <a:font script="Hans" typeface="华文楷体"/>
         <a:font script="Hant" typeface="新細明體"/>
-        <a:font script="Arab" typeface="Arial"/>
-        <a:font script="Hebr" typeface="Arial"/>
-        <a:font script="Thai" typeface="Cordia New"/>
+        <a:font script="Arab" typeface="Tahoma"/>
+        <a:font script="Hebr" typeface="Miriam"/>
+        <a:font script="Thai" typeface="DilleniaUPC"/>
         <a:font script="Ethi" typeface="Nyala"/>
         <a:font script="Beng" typeface="Vrinda"/>
         <a:font script="Gujr" typeface="Shruti"/>
@@ -9694,7 +10617,7 @@
         <a:font script="Geor" typeface="Sylfaen"/>
       </a:minorFont>
     </a:fontScheme>
-    <a:fmtScheme name="Tema do Office">
+    <a:fmtScheme name="Module">
       <a:fillStyleLst>
         <a:solidFill>
           <a:schemeClr val="phClr"/>
@@ -9703,142 +10626,166 @@
           <a:gsLst>
             <a:gs pos="0">
               <a:schemeClr val="phClr">
-                <a:lumMod val="110000"/>
-                <a:satMod val="105000"/>
-                <a:tint val="67000"/>
+                <a:tint val="50000"/>
+                <a:satMod val="300000"/>
               </a:schemeClr>
             </a:gs>
-            <a:gs pos="50000">
+            <a:gs pos="35000">
               <a:schemeClr val="phClr">
-                <a:lumMod val="105000"/>
-                <a:satMod val="103000"/>
-                <a:tint val="73000"/>
+                <a:tint val="37000"/>
+                <a:satMod val="300000"/>
               </a:schemeClr>
             </a:gs>
             <a:gs pos="100000">
               <a:schemeClr val="phClr">
-                <a:lumMod val="105000"/>
-                <a:satMod val="109000"/>
-                <a:tint val="81000"/>
+                <a:tint val="15000"/>
+                <a:satMod val="350000"/>
               </a:schemeClr>
             </a:gs>
           </a:gsLst>
-          <a:lin ang="5400000" scaled="0"/>
+          <a:lin ang="16200000" scaled="1"/>
         </a:gradFill>
         <a:gradFill rotWithShape="1">
           <a:gsLst>
             <a:gs pos="0">
               <a:schemeClr val="phClr">
-                <a:satMod val="103000"/>
-                <a:lumMod val="102000"/>
-                <a:tint val="94000"/>
+                <a:shade val="47500"/>
+                <a:satMod val="137000"/>
               </a:schemeClr>
             </a:gs>
-            <a:gs pos="50000">
+            <a:gs pos="55000">
               <a:schemeClr val="phClr">
-                <a:satMod val="110000"/>
-                <a:lumMod val="100000"/>
-                <a:shade val="100000"/>
+                <a:shade val="69000"/>
+                <a:satMod val="137000"/>
               </a:schemeClr>
             </a:gs>
             <a:gs pos="100000">
               <a:schemeClr val="phClr">
-                <a:lumMod val="99000"/>
-                <a:satMod val="120000"/>
-                <a:shade val="78000"/>
+                <a:shade val="98000"/>
+                <a:satMod val="137000"/>
               </a:schemeClr>
             </a:gs>
           </a:gsLst>
-          <a:lin ang="5400000" scaled="0"/>
+          <a:lin ang="16200000" scaled="0"/>
         </a:gradFill>
       </a:fillStyleLst>
       <a:lnStyleLst>
-        <a:ln w="6350" cap="flat" cmpd="sng" algn="ctr">
+        <a:ln w="6350" cap="rnd" cmpd="sng" algn="ctr">
+          <a:solidFill>
+            <a:schemeClr val="phClr">
+              <a:shade val="95000"/>
+              <a:satMod val="105000"/>
+            </a:schemeClr>
+          </a:solidFill>
+          <a:prstDash val="solid"/>
+        </a:ln>
+        <a:ln w="48000" cap="flat" cmpd="thickThin" algn="ctr">
           <a:solidFill>
             <a:schemeClr val="phClr"/>
           </a:solidFill>
           <a:prstDash val="solid"/>
-          <a:miter lim="800000"/>
         </a:ln>
-        <a:ln w="12700" cap="flat" cmpd="sng" algn="ctr">
+        <a:ln w="48500" cap="flat" cmpd="thickThin" algn="ctr">
           <a:solidFill>
             <a:schemeClr val="phClr"/>
           </a:solidFill>
           <a:prstDash val="solid"/>
-          <a:miter lim="800000"/>
-        </a:ln>
-        <a:ln w="19050" cap="flat" cmpd="sng" algn="ctr">
-          <a:solidFill>
-            <a:schemeClr val="phClr"/>
-          </a:solidFill>
-          <a:prstDash val="solid"/>
-          <a:miter lim="800000"/>
         </a:ln>
       </a:lnStyleLst>
       <a:effectStyleLst>
         <a:effectStyle>
-          <a:effectLst/>
-        </a:effectStyle>
-        <a:effectStyle>
-          <a:effectLst/>
+          <a:effectLst>
+            <a:outerShdw blurRad="45000" dist="25000" dir="5400000" rotWithShape="0">
+              <a:srgbClr val="000000">
+                <a:alpha val="38000"/>
+              </a:srgbClr>
+            </a:outerShdw>
+          </a:effectLst>
         </a:effectStyle>
         <a:effectStyle>
           <a:effectLst>
-            <a:outerShdw blurRad="57150" dist="19050" dir="5400000" algn="ctr" rotWithShape="0">
+            <a:outerShdw blurRad="39000" dist="25400" dir="5400000" rotWithShape="0">
               <a:srgbClr val="000000">
-                <a:alpha val="63000"/>
+                <a:alpha val="38000"/>
               </a:srgbClr>
             </a:outerShdw>
           </a:effectLst>
+        </a:effectStyle>
+        <a:effectStyle>
+          <a:effectLst>
+            <a:outerShdw blurRad="39000" dist="25400" dir="5400000" rotWithShape="0">
+              <a:srgbClr val="000000">
+                <a:alpha val="38000"/>
+              </a:srgbClr>
+            </a:outerShdw>
+          </a:effectLst>
+          <a:scene3d>
+            <a:camera prst="orthographicFront" fov="0">
+              <a:rot lat="0" lon="0" rev="0"/>
+            </a:camera>
+            <a:lightRig rig="threePt" dir="t">
+              <a:rot lat="0" lon="0" rev="1800000"/>
+            </a:lightRig>
+          </a:scene3d>
+          <a:sp3d prstMaterial="matte">
+            <a:bevelT h="20000"/>
+          </a:sp3d>
         </a:effectStyle>
       </a:effectStyleLst>
       <a:bgFillStyleLst>
         <a:solidFill>
           <a:schemeClr val="phClr"/>
         </a:solidFill>
-        <a:solidFill>
-          <a:schemeClr val="phClr">
-            <a:tint val="95000"/>
-            <a:satMod val="170000"/>
-          </a:schemeClr>
-        </a:solidFill>
         <a:gradFill rotWithShape="1">
           <a:gsLst>
             <a:gs pos="0">
               <a:schemeClr val="phClr">
-                <a:tint val="93000"/>
-                <a:satMod val="150000"/>
-                <a:shade val="98000"/>
-                <a:lumMod val="102000"/>
+                <a:tint val="48000"/>
+                <a:satMod val="300000"/>
               </a:schemeClr>
             </a:gs>
-            <a:gs pos="50000">
+            <a:gs pos="12000">
               <a:schemeClr val="phClr">
-                <a:tint val="98000"/>
-                <a:satMod val="130000"/>
-                <a:shade val="90000"/>
-                <a:lumMod val="103000"/>
+                <a:tint val="48000"/>
+                <a:satMod val="300000"/>
+              </a:schemeClr>
+            </a:gs>
+            <a:gs pos="20000">
+              <a:schemeClr val="phClr">
+                <a:tint val="49000"/>
+                <a:satMod val="300000"/>
               </a:schemeClr>
             </a:gs>
             <a:gs pos="100000">
               <a:schemeClr val="phClr">
-                <a:shade val="63000"/>
-                <a:satMod val="120000"/>
+                <a:shade val="30000"/>
               </a:schemeClr>
             </a:gs>
           </a:gsLst>
-          <a:lin ang="5400000" scaled="0"/>
+          <a:path path="circle">
+            <a:fillToRect l="10000" t="-25000" r="10000" b="125000"/>
+          </a:path>
         </a:gradFill>
+        <a:blipFill>
+          <a:blip xmlns:r="http://schemas.openxmlformats.org/officeDocument/2006/relationships" r:embed="rId1">
+            <a:duotone>
+              <a:schemeClr val="phClr">
+                <a:shade val="75000"/>
+                <a:satMod val="105000"/>
+              </a:schemeClr>
+              <a:schemeClr val="phClr">
+                <a:tint val="95000"/>
+                <a:satMod val="105000"/>
+              </a:schemeClr>
+            </a:duotone>
+          </a:blip>
+          <a:tile tx="0" ty="0" sx="38000" sy="38000" flip="none" algn="tl"/>
+        </a:blipFill>
       </a:bgFillStyleLst>
     </a:fmtScheme>
   </a:themeElements>
   <a:objectDefaults/>
   <a:extraClrSchemeLst/>
-  <a:extLst>
-    <a:ext uri="{05A4C25C-085E-4340-85A3-A5531E510DB2}">
-      <thm15:themeFamily xmlns:thm15="http://schemas.microsoft.com/office/thememl/2012/main" name="Office Theme" id="{62F939B6-93AF-4DB8-9C6B-D6C7DFDC589F}" vid="{4A3C46E8-61CC-4603-A589-7422A47A8E4A}"/>
-    </a:ext>
-  </a:extLst>
 </a:theme>
 </file>
 

</xml_diff>